<commit_message>
make empty slide available
</commit_message>
<xml_diff>
--- a/UI/add all slides1.pptx
+++ b/UI/add all slides1.pptx
@@ -7,6 +7,49 @@
   <p:sldIdLst>
     <p:sldId id="256" r:id="rId7"/>
     <p:sldId id="257" r:id="rId8"/>
+    <p:sldId id="258" r:id="rId9"/>
+    <p:sldId id="259" r:id="rId10"/>
+    <p:sldId id="260" r:id="rId11"/>
+    <p:sldId id="261" r:id="rId12"/>
+    <p:sldId id="262" r:id="rId13"/>
+    <p:sldId id="263" r:id="rId14"/>
+    <p:sldId id="264" r:id="rId15"/>
+    <p:sldId id="265" r:id="rId16"/>
+    <p:sldId id="266" r:id="rId17"/>
+    <p:sldId id="267" r:id="rId18"/>
+    <p:sldId id="268" r:id="rId19"/>
+    <p:sldId id="269" r:id="rId20"/>
+    <p:sldId id="270" r:id="rId21"/>
+    <p:sldId id="271" r:id="rId22"/>
+    <p:sldId id="272" r:id="rId23"/>
+    <p:sldId id="273" r:id="rId24"/>
+    <p:sldId id="274" r:id="rId25"/>
+    <p:sldId id="275" r:id="rId26"/>
+    <p:sldId id="276" r:id="rId27"/>
+    <p:sldId id="277" r:id="rId28"/>
+    <p:sldId id="278" r:id="rId29"/>
+    <p:sldId id="279" r:id="rId30"/>
+    <p:sldId id="280" r:id="rId31"/>
+    <p:sldId id="281" r:id="rId32"/>
+    <p:sldId id="282" r:id="rId33"/>
+    <p:sldId id="283" r:id="rId34"/>
+    <p:sldId id="284" r:id="rId35"/>
+    <p:sldId id="285" r:id="rId36"/>
+    <p:sldId id="286" r:id="rId37"/>
+    <p:sldId id="287" r:id="rId38"/>
+    <p:sldId id="288" r:id="rId39"/>
+    <p:sldId id="289" r:id="rId40"/>
+    <p:sldId id="290" r:id="rId41"/>
+    <p:sldId id="291" r:id="rId42"/>
+    <p:sldId id="292" r:id="rId43"/>
+    <p:sldId id="293" r:id="rId44"/>
+    <p:sldId id="294" r:id="rId45"/>
+    <p:sldId id="295" r:id="rId46"/>
+    <p:sldId id="296" r:id="rId47"/>
+    <p:sldId id="297" r:id="rId48"/>
+    <p:sldId id="298" r:id="rId49"/>
+    <p:sldId id="299" r:id="rId50"/>
+    <p:sldId id="300" r:id="rId51"/>
   </p:sldIdLst>
   <p:sldSz cx="9144000" cy="6858000" type="screen4x3"/>
   <p:notesSz cx="6858000" cy="9144000"/>
@@ -3110,12 +3153,682 @@
               </a:defRPr>
             </a:pPr>
             <a:r>
-              <a:t>sfzsfsf</a:t>
+              <a:t>상처를 치료해줄 사람 어디 없나</a:t>
             </a:r>
             <a:br/>
             <a:r>
-              <a:t>zsfzsf</a:t>
-            </a:r>
+              <a:t>가만히 놔두다간 끊임없이 덧나</a:t>
+            </a:r>
+            <a:r>
+              <a:t/>
+            </a:r>
+          </a:p>
+        </p:txBody>
+      </p:sp>
+      <p:sp>
+        <p:nvSpPr>
+          <p:cNvPr id="3" name="Subtitle 2"/>
+          <p:cNvSpPr>
+            <a:spLocks noGrp="1"/>
+          </p:cNvSpPr>
+          <p:nvPr>
+            <p:ph type="subTitle" idx="1"/>
+          </p:nvPr>
+        </p:nvSpPr>
+        <p:spPr/>
+        <p:txBody>
+          <a:bodyPr/>
+          <a:lstStyle/>
+          <a:p/>
+        </p:txBody>
+      </p:sp>
+    </p:spTree>
+  </p:cSld>
+  <p:clrMapOvr>
+    <a:masterClrMapping/>
+  </p:clrMapOvr>
+</p:sld>
+</file>
+
+<file path=ppt/slides/slide10.xml><?xml version="1.0" encoding="utf-8"?>
+<p:sld xmlns:a="http://schemas.openxmlformats.org/drawingml/2006/main" xmlns:p="http://schemas.openxmlformats.org/presentationml/2006/main" xmlns:r="http://schemas.openxmlformats.org/officeDocument/2006/relationships">
+  <p:cSld>
+    <p:spTree>
+      <p:nvGrpSpPr>
+        <p:cNvPr id="1" name=""/>
+        <p:cNvGrpSpPr/>
+        <p:nvPr/>
+      </p:nvGrpSpPr>
+      <p:grpSpPr/>
+      <p:sp>
+        <p:nvSpPr>
+          <p:cNvPr id="2" name="Title 1"/>
+          <p:cNvSpPr>
+            <a:spLocks noGrp="1"/>
+          </p:cNvSpPr>
+          <p:nvPr>
+            <p:ph type="ctrTitle"/>
+          </p:nvPr>
+        </p:nvSpPr>
+        <p:spPr/>
+        <p:txBody>
+          <a:bodyPr/>
+          <a:lstStyle/>
+          <a:p>
+            <a:pPr>
+              <a:defRPr sz="3000">
+                <a:latin typeface="함초름돋음"/>
+              </a:defRPr>
+            </a:pPr>
+            <a:r>
+              <a:t>365일 1년 내내</a:t>
+            </a:r>
+            <a:br/>
+            <a:r>
+              <a:t>방황하는 내 영혼의 조작 키를 잡은 Jack Sparrow</a:t>
+            </a:r>
+            <a:r>
+              <a:t/>
+            </a:r>
+          </a:p>
+        </p:txBody>
+      </p:sp>
+      <p:sp>
+        <p:nvSpPr>
+          <p:cNvPr id="3" name="Subtitle 2"/>
+          <p:cNvSpPr>
+            <a:spLocks noGrp="1"/>
+          </p:cNvSpPr>
+          <p:nvPr>
+            <p:ph type="subTitle" idx="1"/>
+          </p:nvPr>
+        </p:nvSpPr>
+        <p:spPr/>
+        <p:txBody>
+          <a:bodyPr/>
+          <a:lstStyle/>
+          <a:p/>
+        </p:txBody>
+      </p:sp>
+    </p:spTree>
+  </p:cSld>
+  <p:clrMapOvr>
+    <a:masterClrMapping/>
+  </p:clrMapOvr>
+</p:sld>
+</file>
+
+<file path=ppt/slides/slide11.xml><?xml version="1.0" encoding="utf-8"?>
+<p:sld xmlns:a="http://schemas.openxmlformats.org/drawingml/2006/main" xmlns:p="http://schemas.openxmlformats.org/presentationml/2006/main" xmlns:r="http://schemas.openxmlformats.org/officeDocument/2006/relationships">
+  <p:cSld>
+    <p:spTree>
+      <p:nvGrpSpPr>
+        <p:cNvPr id="1" name=""/>
+        <p:cNvGrpSpPr/>
+        <p:nvPr/>
+      </p:nvGrpSpPr>
+      <p:grpSpPr/>
+      <p:sp>
+        <p:nvSpPr>
+          <p:cNvPr id="2" name="Title 1"/>
+          <p:cNvSpPr>
+            <a:spLocks noGrp="1"/>
+          </p:cNvSpPr>
+          <p:nvPr>
+            <p:ph type="ctrTitle"/>
+          </p:nvPr>
+        </p:nvSpPr>
+        <p:spPr/>
+        <p:txBody>
+          <a:bodyPr/>
+          <a:lstStyle/>
+          <a:p>
+            <a:pPr>
+              <a:defRPr sz="3000">
+                <a:latin typeface="함초름돋음"/>
+              </a:defRPr>
+            </a:pPr>
+            <a:r>
+              <a:t>몰아치는 Hurricane 졸라매는 허리끈에</a:t>
+            </a:r>
+            <a:br/>
+            <a:r>
+              <a:t>방향감을 상실하고 길을 잃은 소리꾼</a:t>
+            </a:r>
+            <a:r>
+              <a:t/>
+            </a:r>
+          </a:p>
+        </p:txBody>
+      </p:sp>
+      <p:sp>
+        <p:nvSpPr>
+          <p:cNvPr id="3" name="Subtitle 2"/>
+          <p:cNvSpPr>
+            <a:spLocks noGrp="1"/>
+          </p:cNvSpPr>
+          <p:nvPr>
+            <p:ph type="subTitle" idx="1"/>
+          </p:nvPr>
+        </p:nvSpPr>
+        <p:spPr/>
+        <p:txBody>
+          <a:bodyPr/>
+          <a:lstStyle/>
+          <a:p/>
+        </p:txBody>
+      </p:sp>
+    </p:spTree>
+  </p:cSld>
+  <p:clrMapOvr>
+    <a:masterClrMapping/>
+  </p:clrMapOvr>
+</p:sld>
+</file>
+
+<file path=ppt/slides/slide12.xml><?xml version="1.0" encoding="utf-8"?>
+<p:sld xmlns:a="http://schemas.openxmlformats.org/drawingml/2006/main" xmlns:p="http://schemas.openxmlformats.org/presentationml/2006/main" xmlns:r="http://schemas.openxmlformats.org/officeDocument/2006/relationships">
+  <p:cSld>
+    <p:spTree>
+      <p:nvGrpSpPr>
+        <p:cNvPr id="1" name=""/>
+        <p:cNvGrpSpPr/>
+        <p:nvPr/>
+      </p:nvGrpSpPr>
+      <p:grpSpPr/>
+      <p:sp>
+        <p:nvSpPr>
+          <p:cNvPr id="2" name="Title 1"/>
+          <p:cNvSpPr>
+            <a:spLocks noGrp="1"/>
+          </p:cNvSpPr>
+          <p:nvPr>
+            <p:ph type="ctrTitle"/>
+          </p:nvPr>
+        </p:nvSpPr>
+        <p:spPr/>
+        <p:txBody>
+          <a:bodyPr/>
+          <a:lstStyle/>
+          <a:p>
+            <a:pPr>
+              <a:defRPr sz="3000">
+                <a:latin typeface="함초름돋음"/>
+              </a:defRPr>
+            </a:pPr>
+            <a:r>
+              <a:t>내 안에 숨어 있는 또 다른 나와 싸워</a:t>
+            </a:r>
+            <a:br/>
+            <a:r>
+              <a:t>그녀가 떠나갈때 내게 말했었지</a:t>
+            </a:r>
+            <a:r>
+              <a:t/>
+            </a:r>
+          </a:p>
+        </p:txBody>
+      </p:sp>
+      <p:sp>
+        <p:nvSpPr>
+          <p:cNvPr id="3" name="Subtitle 2"/>
+          <p:cNvSpPr>
+            <a:spLocks noGrp="1"/>
+          </p:cNvSpPr>
+          <p:nvPr>
+            <p:ph type="subTitle" idx="1"/>
+          </p:nvPr>
+        </p:nvSpPr>
+        <p:spPr/>
+        <p:txBody>
+          <a:bodyPr/>
+          <a:lstStyle/>
+          <a:p/>
+        </p:txBody>
+      </p:sp>
+    </p:spTree>
+  </p:cSld>
+  <p:clrMapOvr>
+    <a:masterClrMapping/>
+  </p:clrMapOvr>
+</p:sld>
+</file>
+
+<file path=ppt/slides/slide13.xml><?xml version="1.0" encoding="utf-8"?>
+<p:sld xmlns:a="http://schemas.openxmlformats.org/drawingml/2006/main" xmlns:p="http://schemas.openxmlformats.org/presentationml/2006/main" xmlns:r="http://schemas.openxmlformats.org/officeDocument/2006/relationships">
+  <p:cSld>
+    <p:spTree>
+      <p:nvGrpSpPr>
+        <p:cNvPr id="1" name=""/>
+        <p:cNvGrpSpPr/>
+        <p:nvPr/>
+      </p:nvGrpSpPr>
+      <p:grpSpPr/>
+      <p:sp>
+        <p:nvSpPr>
+          <p:cNvPr id="2" name="Title 1"/>
+          <p:cNvSpPr>
+            <a:spLocks noGrp="1"/>
+          </p:cNvSpPr>
+          <p:nvPr>
+            <p:ph type="ctrTitle"/>
+          </p:nvPr>
+        </p:nvSpPr>
+        <p:spPr/>
+        <p:txBody>
+          <a:bodyPr/>
+          <a:lstStyle/>
+          <a:p>
+            <a:pPr>
+              <a:defRPr sz="3000">
+                <a:latin typeface="함초름돋음"/>
+              </a:defRPr>
+            </a:pPr>
+            <a:r>
+              <a:t>너는 곁에 있어도 있는 게 아닌것 같다고</a:t>
+            </a:r>
+            <a:br/>
+            <a:r>
+              <a:t>만지면 베어버리는 칼날같은 사람</a:t>
+            </a:r>
+            <a:r>
+              <a:t/>
+            </a:r>
+          </a:p>
+        </p:txBody>
+      </p:sp>
+      <p:sp>
+        <p:nvSpPr>
+          <p:cNvPr id="3" name="Subtitle 2"/>
+          <p:cNvSpPr>
+            <a:spLocks noGrp="1"/>
+          </p:cNvSpPr>
+          <p:nvPr>
+            <p:ph type="subTitle" idx="1"/>
+          </p:nvPr>
+        </p:nvSpPr>
+        <p:spPr/>
+        <p:txBody>
+          <a:bodyPr/>
+          <a:lstStyle/>
+          <a:p/>
+        </p:txBody>
+      </p:sp>
+    </p:spTree>
+  </p:cSld>
+  <p:clrMapOvr>
+    <a:masterClrMapping/>
+  </p:clrMapOvr>
+</p:sld>
+</file>
+
+<file path=ppt/slides/slide14.xml><?xml version="1.0" encoding="utf-8"?>
+<p:sld xmlns:a="http://schemas.openxmlformats.org/drawingml/2006/main" xmlns:p="http://schemas.openxmlformats.org/presentationml/2006/main" xmlns:r="http://schemas.openxmlformats.org/officeDocument/2006/relationships">
+  <p:cSld>
+    <p:spTree>
+      <p:nvGrpSpPr>
+        <p:cNvPr id="1" name=""/>
+        <p:cNvGrpSpPr/>
+        <p:nvPr/>
+      </p:nvGrpSpPr>
+      <p:grpSpPr/>
+      <p:sp>
+        <p:nvSpPr>
+          <p:cNvPr id="2" name="Title 1"/>
+          <p:cNvSpPr>
+            <a:spLocks noGrp="1"/>
+          </p:cNvSpPr>
+          <p:nvPr>
+            <p:ph type="ctrTitle"/>
+          </p:nvPr>
+        </p:nvSpPr>
+        <p:spPr/>
+        <p:txBody>
+          <a:bodyPr/>
+          <a:lstStyle/>
+          <a:p>
+            <a:pPr>
+              <a:defRPr sz="3000">
+                <a:latin typeface="함초름돋음"/>
+              </a:defRPr>
+            </a:pPr>
+            <a:r>
+              <a:t>심장이 얼어붙은 차가웠던 사랑</a:t>
+            </a:r>
+            <a:br/>
+            <a:r>
+              <a:t>그래 1분 1초가 사는게 사는게 아냐</a:t>
+            </a:r>
+            <a:r>
+              <a:t/>
+            </a:r>
+          </a:p>
+        </p:txBody>
+      </p:sp>
+      <p:sp>
+        <p:nvSpPr>
+          <p:cNvPr id="3" name="Subtitle 2"/>
+          <p:cNvSpPr>
+            <a:spLocks noGrp="1"/>
+          </p:cNvSpPr>
+          <p:nvPr>
+            <p:ph type="subTitle" idx="1"/>
+          </p:nvPr>
+        </p:nvSpPr>
+        <p:spPr/>
+        <p:txBody>
+          <a:bodyPr/>
+          <a:lstStyle/>
+          <a:p/>
+        </p:txBody>
+      </p:sp>
+    </p:spTree>
+  </p:cSld>
+  <p:clrMapOvr>
+    <a:masterClrMapping/>
+  </p:clrMapOvr>
+</p:sld>
+</file>
+
+<file path=ppt/slides/slide15.xml><?xml version="1.0" encoding="utf-8"?>
+<p:sld xmlns:a="http://schemas.openxmlformats.org/drawingml/2006/main" xmlns:p="http://schemas.openxmlformats.org/presentationml/2006/main" xmlns:r="http://schemas.openxmlformats.org/officeDocument/2006/relationships">
+  <p:cSld>
+    <p:spTree>
+      <p:nvGrpSpPr>
+        <p:cNvPr id="1" name=""/>
+        <p:cNvGrpSpPr/>
+        <p:nvPr/>
+      </p:nvGrpSpPr>
+      <p:grpSpPr/>
+      <p:sp>
+        <p:nvSpPr>
+          <p:cNvPr id="2" name="Title 1"/>
+          <p:cNvSpPr>
+            <a:spLocks noGrp="1"/>
+          </p:cNvSpPr>
+          <p:nvPr>
+            <p:ph type="ctrTitle"/>
+          </p:nvPr>
+        </p:nvSpPr>
+        <p:spPr/>
+        <p:txBody>
+          <a:bodyPr/>
+          <a:lstStyle/>
+          <a:p>
+            <a:pPr>
+              <a:defRPr sz="3000">
+                <a:latin typeface="함초름돋음"/>
+              </a:defRPr>
+            </a:pPr>
+            <a:r>
+              <a:t>매일 매일이 너무나 두려워</a:t>
+            </a:r>
+            <a:br/>
+            <a:r>
+              <a:t>M'aider누가 날 좀 꺼내줘</a:t>
+            </a:r>
+            <a:r>
+              <a:t/>
+            </a:r>
+          </a:p>
+        </p:txBody>
+      </p:sp>
+      <p:sp>
+        <p:nvSpPr>
+          <p:cNvPr id="3" name="Subtitle 2"/>
+          <p:cNvSpPr>
+            <a:spLocks noGrp="1"/>
+          </p:cNvSpPr>
+          <p:nvPr>
+            <p:ph type="subTitle" idx="1"/>
+          </p:nvPr>
+        </p:nvSpPr>
+        <p:spPr/>
+        <p:txBody>
+          <a:bodyPr/>
+          <a:lstStyle/>
+          <a:p/>
+        </p:txBody>
+      </p:sp>
+    </p:spTree>
+  </p:cSld>
+  <p:clrMapOvr>
+    <a:masterClrMapping/>
+  </p:clrMapOvr>
+</p:sld>
+</file>
+
+<file path=ppt/slides/slide16.xml><?xml version="1.0" encoding="utf-8"?>
+<p:sld xmlns:a="http://schemas.openxmlformats.org/drawingml/2006/main" xmlns:p="http://schemas.openxmlformats.org/presentationml/2006/main" xmlns:r="http://schemas.openxmlformats.org/officeDocument/2006/relationships">
+  <p:cSld>
+    <p:spTree>
+      <p:nvGrpSpPr>
+        <p:cNvPr id="1" name=""/>
+        <p:cNvGrpSpPr/>
+        <p:nvPr/>
+      </p:nvGrpSpPr>
+      <p:grpSpPr/>
+      <p:sp>
+        <p:nvSpPr>
+          <p:cNvPr id="2" name="Title 1"/>
+          <p:cNvSpPr>
+            <a:spLocks noGrp="1"/>
+          </p:cNvSpPr>
+          <p:nvPr>
+            <p:ph type="ctrTitle"/>
+          </p:nvPr>
+        </p:nvSpPr>
+        <p:spPr/>
+        <p:txBody>
+          <a:bodyPr/>
+          <a:lstStyle/>
+          <a:p>
+            <a:br/>
+            <a:br/>
+            <a:pPr>
+              <a:defRPr sz="3000">
+                <a:latin typeface="함초름돋음"/>
+              </a:defRPr>
+            </a:pPr>
+            <a:r>
+              <a:t/>
+            </a:r>
+          </a:p>
+        </p:txBody>
+      </p:sp>
+      <p:sp>
+        <p:nvSpPr>
+          <p:cNvPr id="3" name="Subtitle 2"/>
+          <p:cNvSpPr>
+            <a:spLocks noGrp="1"/>
+          </p:cNvSpPr>
+          <p:nvPr>
+            <p:ph type="subTitle" idx="1"/>
+          </p:nvPr>
+        </p:nvSpPr>
+        <p:spPr/>
+        <p:txBody>
+          <a:bodyPr/>
+          <a:lstStyle/>
+          <a:p/>
+        </p:txBody>
+      </p:sp>
+    </p:spTree>
+  </p:cSld>
+  <p:clrMapOvr>
+    <a:masterClrMapping/>
+  </p:clrMapOvr>
+</p:sld>
+</file>
+
+<file path=ppt/slides/slide17.xml><?xml version="1.0" encoding="utf-8"?>
+<p:sld xmlns:a="http://schemas.openxmlformats.org/drawingml/2006/main" xmlns:p="http://schemas.openxmlformats.org/presentationml/2006/main" xmlns:r="http://schemas.openxmlformats.org/officeDocument/2006/relationships">
+  <p:cSld>
+    <p:spTree>
+      <p:nvGrpSpPr>
+        <p:cNvPr id="1" name=""/>
+        <p:cNvGrpSpPr/>
+        <p:nvPr/>
+      </p:nvGrpSpPr>
+      <p:grpSpPr/>
+      <p:sp>
+        <p:nvSpPr>
+          <p:cNvPr id="2" name="Title 1"/>
+          <p:cNvSpPr>
+            <a:spLocks noGrp="1"/>
+          </p:cNvSpPr>
+          <p:nvPr>
+            <p:ph type="ctrTitle"/>
+          </p:nvPr>
+        </p:nvSpPr>
+        <p:spPr/>
+        <p:txBody>
+          <a:bodyPr/>
+          <a:lstStyle/>
+          <a:p>
+            <a:pPr>
+              <a:defRPr sz="3000">
+                <a:latin typeface="함초름돋음"/>
+              </a:defRPr>
+            </a:pPr>
+            <a:r>
+              <a:t>언제나 외톨이 맘의 문을 닫고</a:t>
+            </a:r>
+            <a:br/>
+            <a:r>
+              <a:t>슬픔을 등에 지고 살아가는 바보</a:t>
+            </a:r>
+            <a:r>
+              <a:t/>
+            </a:r>
+          </a:p>
+        </p:txBody>
+      </p:sp>
+      <p:sp>
+        <p:nvSpPr>
+          <p:cNvPr id="3" name="Subtitle 2"/>
+          <p:cNvSpPr>
+            <a:spLocks noGrp="1"/>
+          </p:cNvSpPr>
+          <p:nvPr>
+            <p:ph type="subTitle" idx="1"/>
+          </p:nvPr>
+        </p:nvSpPr>
+        <p:spPr/>
+        <p:txBody>
+          <a:bodyPr/>
+          <a:lstStyle/>
+          <a:p/>
+        </p:txBody>
+      </p:sp>
+    </p:spTree>
+  </p:cSld>
+  <p:clrMapOvr>
+    <a:masterClrMapping/>
+  </p:clrMapOvr>
+</p:sld>
+</file>
+
+<file path=ppt/slides/slide18.xml><?xml version="1.0" encoding="utf-8"?>
+<p:sld xmlns:a="http://schemas.openxmlformats.org/drawingml/2006/main" xmlns:p="http://schemas.openxmlformats.org/presentationml/2006/main" xmlns:r="http://schemas.openxmlformats.org/officeDocument/2006/relationships">
+  <p:cSld>
+    <p:spTree>
+      <p:nvGrpSpPr>
+        <p:cNvPr id="1" name=""/>
+        <p:cNvGrpSpPr/>
+        <p:nvPr/>
+      </p:nvGrpSpPr>
+      <p:grpSpPr/>
+      <p:sp>
+        <p:nvSpPr>
+          <p:cNvPr id="2" name="Title 1"/>
+          <p:cNvSpPr>
+            <a:spLocks noGrp="1"/>
+          </p:cNvSpPr>
+          <p:nvPr>
+            <p:ph type="ctrTitle"/>
+          </p:nvPr>
+        </p:nvSpPr>
+        <p:spPr/>
+        <p:txBody>
+          <a:bodyPr/>
+          <a:lstStyle/>
+          <a:p>
+            <a:pPr>
+              <a:defRPr sz="3000">
+                <a:latin typeface="함초름돋음"/>
+              </a:defRPr>
+            </a:pPr>
+            <a:r>
+              <a:t>두 눈을 감고 두 귀를 막고</a:t>
+            </a:r>
+            <a:br/>
+            <a:r>
+              <a:t>캄캄한 어둠속에 내 자신을 가둬</a:t>
+            </a:r>
+            <a:r>
+              <a:t/>
+            </a:r>
+          </a:p>
+        </p:txBody>
+      </p:sp>
+      <p:sp>
+        <p:nvSpPr>
+          <p:cNvPr id="3" name="Subtitle 2"/>
+          <p:cNvSpPr>
+            <a:spLocks noGrp="1"/>
+          </p:cNvSpPr>
+          <p:nvPr>
+            <p:ph type="subTitle" idx="1"/>
+          </p:nvPr>
+        </p:nvSpPr>
+        <p:spPr/>
+        <p:txBody>
+          <a:bodyPr/>
+          <a:lstStyle/>
+          <a:p/>
+        </p:txBody>
+      </p:sp>
+    </p:spTree>
+  </p:cSld>
+  <p:clrMapOvr>
+    <a:masterClrMapping/>
+  </p:clrMapOvr>
+</p:sld>
+</file>
+
+<file path=ppt/slides/slide19.xml><?xml version="1.0" encoding="utf-8"?>
+<p:sld xmlns:a="http://schemas.openxmlformats.org/drawingml/2006/main" xmlns:p="http://schemas.openxmlformats.org/presentationml/2006/main" xmlns:r="http://schemas.openxmlformats.org/officeDocument/2006/relationships">
+  <p:cSld>
+    <p:spTree>
+      <p:nvGrpSpPr>
+        <p:cNvPr id="1" name=""/>
+        <p:cNvGrpSpPr/>
+        <p:nvPr/>
+      </p:nvGrpSpPr>
+      <p:grpSpPr/>
+      <p:sp>
+        <p:nvSpPr>
+          <p:cNvPr id="2" name="Title 1"/>
+          <p:cNvSpPr>
+            <a:spLocks noGrp="1"/>
+          </p:cNvSpPr>
+          <p:nvPr>
+            <p:ph type="ctrTitle"/>
+          </p:nvPr>
+        </p:nvSpPr>
+        <p:spPr/>
+        <p:txBody>
+          <a:bodyPr/>
+          <a:lstStyle/>
+          <a:p>
+            <a:br/>
+            <a:br/>
+            <a:pPr>
+              <a:defRPr sz="3000">
+                <a:latin typeface="함초름돋음"/>
+              </a:defRPr>
+            </a:pPr>
             <a:r>
               <a:t/>
             </a:r>
@@ -3178,8 +3891,2205 @@
               </a:defRPr>
             </a:pPr>
             <a:r>
-              <a:t>zsfzsfzsfzsf</a:t>
-            </a:r>
+              <a:t>사랑도 사람도 너무나도 겁나</a:t>
+            </a:r>
+            <a:br/>
+            <a:r>
+              <a:t>혼자인게 무서워 난 잊혀질까 두려워</a:t>
+            </a:r>
+            <a:r>
+              <a:t/>
+            </a:r>
+          </a:p>
+        </p:txBody>
+      </p:sp>
+      <p:sp>
+        <p:nvSpPr>
+          <p:cNvPr id="3" name="Subtitle 2"/>
+          <p:cNvSpPr>
+            <a:spLocks noGrp="1"/>
+          </p:cNvSpPr>
+          <p:nvPr>
+            <p:ph type="subTitle" idx="1"/>
+          </p:nvPr>
+        </p:nvSpPr>
+        <p:spPr/>
+        <p:txBody>
+          <a:bodyPr/>
+          <a:lstStyle/>
+          <a:p/>
+        </p:txBody>
+      </p:sp>
+    </p:spTree>
+  </p:cSld>
+  <p:clrMapOvr>
+    <a:masterClrMapping/>
+  </p:clrMapOvr>
+</p:sld>
+</file>
+
+<file path=ppt/slides/slide20.xml><?xml version="1.0" encoding="utf-8"?>
+<p:sld xmlns:a="http://schemas.openxmlformats.org/drawingml/2006/main" xmlns:p="http://schemas.openxmlformats.org/presentationml/2006/main" xmlns:r="http://schemas.openxmlformats.org/officeDocument/2006/relationships">
+  <p:cSld>
+    <p:spTree>
+      <p:nvGrpSpPr>
+        <p:cNvPr id="1" name=""/>
+        <p:cNvGrpSpPr/>
+        <p:nvPr/>
+      </p:nvGrpSpPr>
+      <p:grpSpPr/>
+      <p:sp>
+        <p:nvSpPr>
+          <p:cNvPr id="2" name="Title 1"/>
+          <p:cNvSpPr>
+            <a:spLocks noGrp="1"/>
+          </p:cNvSpPr>
+          <p:nvPr>
+            <p:ph type="ctrTitle"/>
+          </p:nvPr>
+        </p:nvSpPr>
+        <p:spPr/>
+        <p:txBody>
+          <a:bodyPr/>
+          <a:lstStyle/>
+          <a:p>
+            <a:pPr>
+              <a:defRPr sz="3000">
+                <a:latin typeface="함초름돋음"/>
+              </a:defRPr>
+            </a:pPr>
+            <a:r>
+              <a:t>언제나 외톨이 맘의 문을 닫고</a:t>
+            </a:r>
+            <a:br/>
+            <a:r>
+              <a:t>슬픔을 등에 지고 살아가는 바보</a:t>
+            </a:r>
+            <a:r>
+              <a:t/>
+            </a:r>
+          </a:p>
+        </p:txBody>
+      </p:sp>
+      <p:sp>
+        <p:nvSpPr>
+          <p:cNvPr id="3" name="Subtitle 2"/>
+          <p:cNvSpPr>
+            <a:spLocks noGrp="1"/>
+          </p:cNvSpPr>
+          <p:nvPr>
+            <p:ph type="subTitle" idx="1"/>
+          </p:nvPr>
+        </p:nvSpPr>
+        <p:spPr/>
+        <p:txBody>
+          <a:bodyPr/>
+          <a:lstStyle/>
+          <a:p/>
+        </p:txBody>
+      </p:sp>
+    </p:spTree>
+  </p:cSld>
+  <p:clrMapOvr>
+    <a:masterClrMapping/>
+  </p:clrMapOvr>
+</p:sld>
+</file>
+
+<file path=ppt/slides/slide21.xml><?xml version="1.0" encoding="utf-8"?>
+<p:sld xmlns:a="http://schemas.openxmlformats.org/drawingml/2006/main" xmlns:p="http://schemas.openxmlformats.org/presentationml/2006/main" xmlns:r="http://schemas.openxmlformats.org/officeDocument/2006/relationships">
+  <p:cSld>
+    <p:spTree>
+      <p:nvGrpSpPr>
+        <p:cNvPr id="1" name=""/>
+        <p:cNvGrpSpPr/>
+        <p:nvPr/>
+      </p:nvGrpSpPr>
+      <p:grpSpPr/>
+      <p:sp>
+        <p:nvSpPr>
+          <p:cNvPr id="2" name="Title 1"/>
+          <p:cNvSpPr>
+            <a:spLocks noGrp="1"/>
+          </p:cNvSpPr>
+          <p:nvPr>
+            <p:ph type="ctrTitle"/>
+          </p:nvPr>
+        </p:nvSpPr>
+        <p:spPr/>
+        <p:txBody>
+          <a:bodyPr/>
+          <a:lstStyle/>
+          <a:p>
+            <a:pPr>
+              <a:defRPr sz="3000">
+                <a:latin typeface="함초름돋음"/>
+              </a:defRPr>
+            </a:pPr>
+            <a:r>
+              <a:t>두 눈을 감고 두 귀를 막고</a:t>
+            </a:r>
+            <a:br/>
+            <a:r>
+              <a:t>캄캄한 어둠속에 내 자신을 가둬</a:t>
+            </a:r>
+            <a:r>
+              <a:t/>
+            </a:r>
+          </a:p>
+        </p:txBody>
+      </p:sp>
+      <p:sp>
+        <p:nvSpPr>
+          <p:cNvPr id="3" name="Subtitle 2"/>
+          <p:cNvSpPr>
+            <a:spLocks noGrp="1"/>
+          </p:cNvSpPr>
+          <p:nvPr>
+            <p:ph type="subTitle" idx="1"/>
+          </p:nvPr>
+        </p:nvSpPr>
+        <p:spPr/>
+        <p:txBody>
+          <a:bodyPr/>
+          <a:lstStyle/>
+          <a:p/>
+        </p:txBody>
+      </p:sp>
+    </p:spTree>
+  </p:cSld>
+  <p:clrMapOvr>
+    <a:masterClrMapping/>
+  </p:clrMapOvr>
+</p:sld>
+</file>
+
+<file path=ppt/slides/slide22.xml><?xml version="1.0" encoding="utf-8"?>
+<p:sld xmlns:a="http://schemas.openxmlformats.org/drawingml/2006/main" xmlns:p="http://schemas.openxmlformats.org/presentationml/2006/main" xmlns:r="http://schemas.openxmlformats.org/officeDocument/2006/relationships">
+  <p:cSld>
+    <p:spTree>
+      <p:nvGrpSpPr>
+        <p:cNvPr id="1" name=""/>
+        <p:cNvGrpSpPr/>
+        <p:nvPr/>
+      </p:nvGrpSpPr>
+      <p:grpSpPr/>
+      <p:sp>
+        <p:nvSpPr>
+          <p:cNvPr id="2" name="Title 1"/>
+          <p:cNvSpPr>
+            <a:spLocks noGrp="1"/>
+          </p:cNvSpPr>
+          <p:nvPr>
+            <p:ph type="ctrTitle"/>
+          </p:nvPr>
+        </p:nvSpPr>
+        <p:spPr/>
+        <p:txBody>
+          <a:bodyPr/>
+          <a:lstStyle/>
+          <a:p>
+            <a:br/>
+            <a:br/>
+            <a:pPr>
+              <a:defRPr sz="3000">
+                <a:latin typeface="함초름돋음"/>
+              </a:defRPr>
+            </a:pPr>
+            <a:r>
+              <a:t/>
+            </a:r>
+          </a:p>
+        </p:txBody>
+      </p:sp>
+      <p:sp>
+        <p:nvSpPr>
+          <p:cNvPr id="3" name="Subtitle 2"/>
+          <p:cNvSpPr>
+            <a:spLocks noGrp="1"/>
+          </p:cNvSpPr>
+          <p:nvPr>
+            <p:ph type="subTitle" idx="1"/>
+          </p:nvPr>
+        </p:nvSpPr>
+        <p:spPr/>
+        <p:txBody>
+          <a:bodyPr/>
+          <a:lstStyle/>
+          <a:p/>
+        </p:txBody>
+      </p:sp>
+    </p:spTree>
+  </p:cSld>
+  <p:clrMapOvr>
+    <a:masterClrMapping/>
+  </p:clrMapOvr>
+</p:sld>
+</file>
+
+<file path=ppt/slides/slide23.xml><?xml version="1.0" encoding="utf-8"?>
+<p:sld xmlns:a="http://schemas.openxmlformats.org/drawingml/2006/main" xmlns:p="http://schemas.openxmlformats.org/presentationml/2006/main" xmlns:r="http://schemas.openxmlformats.org/officeDocument/2006/relationships">
+  <p:cSld>
+    <p:spTree>
+      <p:nvGrpSpPr>
+        <p:cNvPr id="1" name=""/>
+        <p:cNvGrpSpPr/>
+        <p:nvPr/>
+      </p:nvGrpSpPr>
+      <p:grpSpPr/>
+      <p:sp>
+        <p:nvSpPr>
+          <p:cNvPr id="2" name="Title 1"/>
+          <p:cNvSpPr>
+            <a:spLocks noGrp="1"/>
+          </p:cNvSpPr>
+          <p:nvPr>
+            <p:ph type="ctrTitle"/>
+          </p:nvPr>
+        </p:nvSpPr>
+        <p:spPr/>
+        <p:txBody>
+          <a:bodyPr/>
+          <a:lstStyle/>
+          <a:p>
+            <a:pPr>
+              <a:defRPr sz="3000">
+                <a:latin typeface="함초름돋음"/>
+              </a:defRPr>
+            </a:pPr>
+            <a:r>
+              <a:t>아무도 모르게 다가온 이별에 대면했을때</a:t>
+            </a:r>
+            <a:br/>
+            <a:r>
+              <a:t>또 다시 혼자가 되는게 두려워 외면했었네</a:t>
+            </a:r>
+            <a:r>
+              <a:t/>
+            </a:r>
+          </a:p>
+        </p:txBody>
+      </p:sp>
+      <p:sp>
+        <p:nvSpPr>
+          <p:cNvPr id="3" name="Subtitle 2"/>
+          <p:cNvSpPr>
+            <a:spLocks noGrp="1"/>
+          </p:cNvSpPr>
+          <p:nvPr>
+            <p:ph type="subTitle" idx="1"/>
+          </p:nvPr>
+        </p:nvSpPr>
+        <p:spPr/>
+        <p:txBody>
+          <a:bodyPr/>
+          <a:lstStyle/>
+          <a:p/>
+        </p:txBody>
+      </p:sp>
+    </p:spTree>
+  </p:cSld>
+  <p:clrMapOvr>
+    <a:masterClrMapping/>
+  </p:clrMapOvr>
+</p:sld>
+</file>
+
+<file path=ppt/slides/slide24.xml><?xml version="1.0" encoding="utf-8"?>
+<p:sld xmlns:a="http://schemas.openxmlformats.org/drawingml/2006/main" xmlns:p="http://schemas.openxmlformats.org/presentationml/2006/main" xmlns:r="http://schemas.openxmlformats.org/officeDocument/2006/relationships">
+  <p:cSld>
+    <p:spTree>
+      <p:nvGrpSpPr>
+        <p:cNvPr id="1" name=""/>
+        <p:cNvGrpSpPr/>
+        <p:nvPr/>
+      </p:nvGrpSpPr>
+      <p:grpSpPr/>
+      <p:sp>
+        <p:nvSpPr>
+          <p:cNvPr id="2" name="Title 1"/>
+          <p:cNvSpPr>
+            <a:spLocks noGrp="1"/>
+          </p:cNvSpPr>
+          <p:nvPr>
+            <p:ph type="ctrTitle"/>
+          </p:nvPr>
+        </p:nvSpPr>
+        <p:spPr/>
+        <p:txBody>
+          <a:bodyPr/>
+          <a:lstStyle/>
+          <a:p>
+            <a:pPr>
+              <a:defRPr sz="3000">
+                <a:latin typeface="함초름돋음"/>
+              </a:defRPr>
+            </a:pPr>
+            <a:r>
+              <a:t>꿈에도 그리던 지나간 시간이 다시금 내게로</a:t>
+            </a:r>
+            <a:br/>
+            <a:r>
+              <a:t>되돌아오기를 바라며 간절한 맘으로 밤마다 기도했었네</a:t>
+            </a:r>
+            <a:r>
+              <a:t/>
+            </a:r>
+          </a:p>
+        </p:txBody>
+      </p:sp>
+      <p:sp>
+        <p:nvSpPr>
+          <p:cNvPr id="3" name="Subtitle 2"/>
+          <p:cNvSpPr>
+            <a:spLocks noGrp="1"/>
+          </p:cNvSpPr>
+          <p:nvPr>
+            <p:ph type="subTitle" idx="1"/>
+          </p:nvPr>
+        </p:nvSpPr>
+        <p:spPr/>
+        <p:txBody>
+          <a:bodyPr/>
+          <a:lstStyle/>
+          <a:p/>
+        </p:txBody>
+      </p:sp>
+    </p:spTree>
+  </p:cSld>
+  <p:clrMapOvr>
+    <a:masterClrMapping/>
+  </p:clrMapOvr>
+</p:sld>
+</file>
+
+<file path=ppt/slides/slide25.xml><?xml version="1.0" encoding="utf-8"?>
+<p:sld xmlns:a="http://schemas.openxmlformats.org/drawingml/2006/main" xmlns:p="http://schemas.openxmlformats.org/presentationml/2006/main" xmlns:r="http://schemas.openxmlformats.org/officeDocument/2006/relationships">
+  <p:cSld>
+    <p:spTree>
+      <p:nvGrpSpPr>
+        <p:cNvPr id="1" name=""/>
+        <p:cNvGrpSpPr/>
+        <p:nvPr/>
+      </p:nvGrpSpPr>
+      <p:grpSpPr/>
+      <p:sp>
+        <p:nvSpPr>
+          <p:cNvPr id="2" name="Title 1"/>
+          <p:cNvSpPr>
+            <a:spLocks noGrp="1"/>
+          </p:cNvSpPr>
+          <p:nvPr>
+            <p:ph type="ctrTitle"/>
+          </p:nvPr>
+        </p:nvSpPr>
+        <p:spPr/>
+        <p:txBody>
+          <a:bodyPr/>
+          <a:lstStyle/>
+          <a:p>
+            <a:br/>
+            <a:br/>
+            <a:pPr>
+              <a:defRPr sz="3000">
+                <a:latin typeface="함초름돋음"/>
+              </a:defRPr>
+            </a:pPr>
+            <a:r>
+              <a:t/>
+            </a:r>
+          </a:p>
+        </p:txBody>
+      </p:sp>
+      <p:sp>
+        <p:nvSpPr>
+          <p:cNvPr id="3" name="Subtitle 2"/>
+          <p:cNvSpPr>
+            <a:spLocks noGrp="1"/>
+          </p:cNvSpPr>
+          <p:nvPr>
+            <p:ph type="subTitle" idx="1"/>
+          </p:nvPr>
+        </p:nvSpPr>
+        <p:spPr/>
+        <p:txBody>
+          <a:bodyPr/>
+          <a:lstStyle/>
+          <a:p/>
+        </p:txBody>
+      </p:sp>
+    </p:spTree>
+  </p:cSld>
+  <p:clrMapOvr>
+    <a:masterClrMapping/>
+  </p:clrMapOvr>
+</p:sld>
+</file>
+
+<file path=ppt/slides/slide26.xml><?xml version="1.0" encoding="utf-8"?>
+<p:sld xmlns:a="http://schemas.openxmlformats.org/drawingml/2006/main" xmlns:p="http://schemas.openxmlformats.org/presentationml/2006/main" xmlns:r="http://schemas.openxmlformats.org/officeDocument/2006/relationships">
+  <p:cSld>
+    <p:spTree>
+      <p:nvGrpSpPr>
+        <p:cNvPr id="1" name=""/>
+        <p:cNvGrpSpPr/>
+        <p:nvPr/>
+      </p:nvGrpSpPr>
+      <p:grpSpPr/>
+      <p:sp>
+        <p:nvSpPr>
+          <p:cNvPr id="2" name="Title 1"/>
+          <p:cNvSpPr>
+            <a:spLocks noGrp="1"/>
+          </p:cNvSpPr>
+          <p:nvPr>
+            <p:ph type="ctrTitle"/>
+          </p:nvPr>
+        </p:nvSpPr>
+        <p:spPr/>
+        <p:txBody>
+          <a:bodyPr/>
+          <a:lstStyle/>
+          <a:p>
+            <a:pPr>
+              <a:defRPr sz="3000">
+                <a:latin typeface="함초름돋음"/>
+              </a:defRPr>
+            </a:pPr>
+            <a:r>
+              <a:t>시위를 당기고 내 손을 떠나간 추억의 화살이</a:t>
+            </a:r>
+            <a:br/>
+            <a:r>
+              <a:t>머나먼 과녁을 향해서 한없이 빠르게 날아가</a:t>
+            </a:r>
+            <a:r>
+              <a:t/>
+            </a:r>
+          </a:p>
+        </p:txBody>
+      </p:sp>
+      <p:sp>
+        <p:nvSpPr>
+          <p:cNvPr id="3" name="Subtitle 2"/>
+          <p:cNvSpPr>
+            <a:spLocks noGrp="1"/>
+          </p:cNvSpPr>
+          <p:nvPr>
+            <p:ph type="subTitle" idx="1"/>
+          </p:nvPr>
+        </p:nvSpPr>
+        <p:spPr/>
+        <p:txBody>
+          <a:bodyPr/>
+          <a:lstStyle/>
+          <a:p/>
+        </p:txBody>
+      </p:sp>
+    </p:spTree>
+  </p:cSld>
+  <p:clrMapOvr>
+    <a:masterClrMapping/>
+  </p:clrMapOvr>
+</p:sld>
+</file>
+
+<file path=ppt/slides/slide27.xml><?xml version="1.0" encoding="utf-8"?>
+<p:sld xmlns:a="http://schemas.openxmlformats.org/drawingml/2006/main" xmlns:p="http://schemas.openxmlformats.org/presentationml/2006/main" xmlns:r="http://schemas.openxmlformats.org/officeDocument/2006/relationships">
+  <p:cSld>
+    <p:spTree>
+      <p:nvGrpSpPr>
+        <p:cNvPr id="1" name=""/>
+        <p:cNvGrpSpPr/>
+        <p:nvPr/>
+      </p:nvGrpSpPr>
+      <p:grpSpPr/>
+      <p:sp>
+        <p:nvSpPr>
+          <p:cNvPr id="2" name="Title 1"/>
+          <p:cNvSpPr>
+            <a:spLocks noGrp="1"/>
+          </p:cNvSpPr>
+          <p:nvPr>
+            <p:ph type="ctrTitle"/>
+          </p:nvPr>
+        </p:nvSpPr>
+        <p:spPr/>
+        <p:txBody>
+          <a:bodyPr/>
+          <a:lstStyle/>
+          <a:p>
+            <a:pPr>
+              <a:defRPr sz="3000">
+                <a:latin typeface="함초름돋음"/>
+              </a:defRPr>
+            </a:pPr>
+            <a:r>
+              <a:t>내게로 돌아와 달라고 내 손을 붙잡아 달라고</a:t>
+            </a:r>
+            <a:br/>
+            <a:r>
+              <a:t>부르고 불러도 한없이 소리쳐 대봐도</a:t>
+            </a:r>
+            <a:r>
+              <a:t/>
+            </a:r>
+          </a:p>
+        </p:txBody>
+      </p:sp>
+      <p:sp>
+        <p:nvSpPr>
+          <p:cNvPr id="3" name="Subtitle 2"/>
+          <p:cNvSpPr>
+            <a:spLocks noGrp="1"/>
+          </p:cNvSpPr>
+          <p:nvPr>
+            <p:ph type="subTitle" idx="1"/>
+          </p:nvPr>
+        </p:nvSpPr>
+        <p:spPr/>
+        <p:txBody>
+          <a:bodyPr/>
+          <a:lstStyle/>
+          <a:p/>
+        </p:txBody>
+      </p:sp>
+    </p:spTree>
+  </p:cSld>
+  <p:clrMapOvr>
+    <a:masterClrMapping/>
+  </p:clrMapOvr>
+</p:sld>
+</file>
+
+<file path=ppt/slides/slide28.xml><?xml version="1.0" encoding="utf-8"?>
+<p:sld xmlns:a="http://schemas.openxmlformats.org/drawingml/2006/main" xmlns:p="http://schemas.openxmlformats.org/presentationml/2006/main" xmlns:r="http://schemas.openxmlformats.org/officeDocument/2006/relationships">
+  <p:cSld>
+    <p:spTree>
+      <p:nvGrpSpPr>
+        <p:cNvPr id="1" name=""/>
+        <p:cNvGrpSpPr/>
+        <p:nvPr/>
+      </p:nvGrpSpPr>
+      <p:grpSpPr/>
+      <p:sp>
+        <p:nvSpPr>
+          <p:cNvPr id="2" name="Title 1"/>
+          <p:cNvSpPr>
+            <a:spLocks noGrp="1"/>
+          </p:cNvSpPr>
+          <p:nvPr>
+            <p:ph type="ctrTitle"/>
+          </p:nvPr>
+        </p:nvSpPr>
+        <p:spPr/>
+        <p:txBody>
+          <a:bodyPr/>
+          <a:lstStyle/>
+          <a:p>
+            <a:pPr>
+              <a:defRPr sz="3000">
+                <a:latin typeface="함초름돋음"/>
+              </a:defRPr>
+            </a:pPr>
+            <a:r>
+              <a:t>아무런 대답이 없는 널</a:t>
+            </a:r>
+            <a:br/>
+            <a:r>
+              <a:t/>
+            </a:r>
+          </a:p>
+        </p:txBody>
+      </p:sp>
+      <p:sp>
+        <p:nvSpPr>
+          <p:cNvPr id="3" name="Subtitle 2"/>
+          <p:cNvSpPr>
+            <a:spLocks noGrp="1"/>
+          </p:cNvSpPr>
+          <p:nvPr>
+            <p:ph type="subTitle" idx="1"/>
+          </p:nvPr>
+        </p:nvSpPr>
+        <p:spPr/>
+        <p:txBody>
+          <a:bodyPr/>
+          <a:lstStyle/>
+          <a:p/>
+        </p:txBody>
+      </p:sp>
+    </p:spTree>
+  </p:cSld>
+  <p:clrMapOvr>
+    <a:masterClrMapping/>
+  </p:clrMapOvr>
+</p:sld>
+</file>
+
+<file path=ppt/slides/slide29.xml><?xml version="1.0" encoding="utf-8"?>
+<p:sld xmlns:a="http://schemas.openxmlformats.org/drawingml/2006/main" xmlns:p="http://schemas.openxmlformats.org/presentationml/2006/main" xmlns:r="http://schemas.openxmlformats.org/officeDocument/2006/relationships">
+  <p:cSld>
+    <p:spTree>
+      <p:nvGrpSpPr>
+        <p:cNvPr id="1" name=""/>
+        <p:cNvGrpSpPr/>
+        <p:nvPr/>
+      </p:nvGrpSpPr>
+      <p:grpSpPr/>
+      <p:sp>
+        <p:nvSpPr>
+          <p:cNvPr id="2" name="Title 1"/>
+          <p:cNvSpPr>
+            <a:spLocks noGrp="1"/>
+          </p:cNvSpPr>
+          <p:nvPr>
+            <p:ph type="ctrTitle"/>
+          </p:nvPr>
+        </p:nvSpPr>
+        <p:spPr/>
+        <p:txBody>
+          <a:bodyPr/>
+          <a:lstStyle/>
+          <a:p>
+            <a:pPr>
+              <a:defRPr sz="3000">
+                <a:latin typeface="함초름돋음"/>
+              </a:defRPr>
+            </a:pPr>
+            <a:r>
+              <a:t>내 기억 속에서 너라는 사람의</a:t>
+            </a:r>
+            <a:br/>
+            <a:r>
+              <a:t>존재를 완전히 지우려 끝없이 몸부림쳐 봐도</a:t>
+            </a:r>
+            <a:r>
+              <a:t/>
+            </a:r>
+          </a:p>
+        </p:txBody>
+      </p:sp>
+      <p:sp>
+        <p:nvSpPr>
+          <p:cNvPr id="3" name="Subtitle 2"/>
+          <p:cNvSpPr>
+            <a:spLocks noGrp="1"/>
+          </p:cNvSpPr>
+          <p:nvPr>
+            <p:ph type="subTitle" idx="1"/>
+          </p:nvPr>
+        </p:nvSpPr>
+        <p:spPr/>
+        <p:txBody>
+          <a:bodyPr/>
+          <a:lstStyle/>
+          <a:p/>
+        </p:txBody>
+      </p:sp>
+    </p:spTree>
+  </p:cSld>
+  <p:clrMapOvr>
+    <a:masterClrMapping/>
+  </p:clrMapOvr>
+</p:sld>
+</file>
+
+<file path=ppt/slides/slide3.xml><?xml version="1.0" encoding="utf-8"?>
+<p:sld xmlns:a="http://schemas.openxmlformats.org/drawingml/2006/main" xmlns:p="http://schemas.openxmlformats.org/presentationml/2006/main" xmlns:r="http://schemas.openxmlformats.org/officeDocument/2006/relationships">
+  <p:cSld>
+    <p:spTree>
+      <p:nvGrpSpPr>
+        <p:cNvPr id="1" name=""/>
+        <p:cNvGrpSpPr/>
+        <p:nvPr/>
+      </p:nvGrpSpPr>
+      <p:grpSpPr/>
+      <p:sp>
+        <p:nvSpPr>
+          <p:cNvPr id="2" name="Title 1"/>
+          <p:cNvSpPr>
+            <a:spLocks noGrp="1"/>
+          </p:cNvSpPr>
+          <p:nvPr>
+            <p:ph type="ctrTitle"/>
+          </p:nvPr>
+        </p:nvSpPr>
+        <p:spPr/>
+        <p:txBody>
+          <a:bodyPr/>
+          <a:lstStyle/>
+          <a:p>
+            <a:br/>
+            <a:br/>
+            <a:pPr>
+              <a:defRPr sz="3000">
+                <a:latin typeface="함초름돋음"/>
+              </a:defRPr>
+            </a:pPr>
+            <a:r>
+              <a:t/>
+            </a:r>
+          </a:p>
+        </p:txBody>
+      </p:sp>
+      <p:sp>
+        <p:nvSpPr>
+          <p:cNvPr id="3" name="Subtitle 2"/>
+          <p:cNvSpPr>
+            <a:spLocks noGrp="1"/>
+          </p:cNvSpPr>
+          <p:nvPr>
+            <p:ph type="subTitle" idx="1"/>
+          </p:nvPr>
+        </p:nvSpPr>
+        <p:spPr/>
+        <p:txBody>
+          <a:bodyPr/>
+          <a:lstStyle/>
+          <a:p/>
+        </p:txBody>
+      </p:sp>
+    </p:spTree>
+  </p:cSld>
+  <p:clrMapOvr>
+    <a:masterClrMapping/>
+  </p:clrMapOvr>
+</p:sld>
+</file>
+
+<file path=ppt/slides/slide30.xml><?xml version="1.0" encoding="utf-8"?>
+<p:sld xmlns:a="http://schemas.openxmlformats.org/drawingml/2006/main" xmlns:p="http://schemas.openxmlformats.org/presentationml/2006/main" xmlns:r="http://schemas.openxmlformats.org/officeDocument/2006/relationships">
+  <p:cSld>
+    <p:spTree>
+      <p:nvGrpSpPr>
+        <p:cNvPr id="1" name=""/>
+        <p:cNvGrpSpPr/>
+        <p:nvPr/>
+      </p:nvGrpSpPr>
+      <p:grpSpPr/>
+      <p:sp>
+        <p:nvSpPr>
+          <p:cNvPr id="2" name="Title 1"/>
+          <p:cNvSpPr>
+            <a:spLocks noGrp="1"/>
+          </p:cNvSpPr>
+          <p:nvPr>
+            <p:ph type="ctrTitle"/>
+          </p:nvPr>
+        </p:nvSpPr>
+        <p:spPr/>
+        <p:txBody>
+          <a:bodyPr/>
+          <a:lstStyle/>
+          <a:p>
+            <a:pPr>
+              <a:defRPr sz="3000">
+                <a:latin typeface="함초름돋음"/>
+              </a:defRPr>
+            </a:pPr>
+            <a:r>
+              <a:t>매일밤 꿈에서 그대가 나타나 흐르는 눈물을 닦아주는걸</a:t>
+            </a:r>
+            <a:br/>
+            <a:r>
+              <a:t/>
+            </a:r>
+          </a:p>
+        </p:txBody>
+      </p:sp>
+      <p:sp>
+        <p:nvSpPr>
+          <p:cNvPr id="3" name="Subtitle 2"/>
+          <p:cNvSpPr>
+            <a:spLocks noGrp="1"/>
+          </p:cNvSpPr>
+          <p:nvPr>
+            <p:ph type="subTitle" idx="1"/>
+          </p:nvPr>
+        </p:nvSpPr>
+        <p:spPr/>
+        <p:txBody>
+          <a:bodyPr/>
+          <a:lstStyle/>
+          <a:p/>
+        </p:txBody>
+      </p:sp>
+    </p:spTree>
+  </p:cSld>
+  <p:clrMapOvr>
+    <a:masterClrMapping/>
+  </p:clrMapOvr>
+</p:sld>
+</file>
+
+<file path=ppt/slides/slide31.xml><?xml version="1.0" encoding="utf-8"?>
+<p:sld xmlns:a="http://schemas.openxmlformats.org/drawingml/2006/main" xmlns:p="http://schemas.openxmlformats.org/presentationml/2006/main" xmlns:r="http://schemas.openxmlformats.org/officeDocument/2006/relationships">
+  <p:cSld>
+    <p:spTree>
+      <p:nvGrpSpPr>
+        <p:cNvPr id="1" name=""/>
+        <p:cNvGrpSpPr/>
+        <p:nvPr/>
+      </p:nvGrpSpPr>
+      <p:grpSpPr/>
+      <p:sp>
+        <p:nvSpPr>
+          <p:cNvPr id="2" name="Title 1"/>
+          <p:cNvSpPr>
+            <a:spLocks noGrp="1"/>
+          </p:cNvSpPr>
+          <p:nvPr>
+            <p:ph type="ctrTitle"/>
+          </p:nvPr>
+        </p:nvSpPr>
+        <p:spPr/>
+        <p:txBody>
+          <a:bodyPr/>
+          <a:lstStyle/>
+          <a:p>
+            <a:pPr>
+              <a:defRPr sz="3000">
+                <a:latin typeface="함초름돋음"/>
+              </a:defRPr>
+            </a:pPr>
+            <a:r>
+              <a:t>나 어떡하라고 다 끄떡없다고</a:t>
+            </a:r>
+            <a:br/>
+            <a:r>
+              <a:t>거짓말 하라고 더는 못 참겠다고</a:t>
+            </a:r>
+            <a:r>
+              <a:t/>
+            </a:r>
+          </a:p>
+        </p:txBody>
+      </p:sp>
+      <p:sp>
+        <p:nvSpPr>
+          <p:cNvPr id="3" name="Subtitle 2"/>
+          <p:cNvSpPr>
+            <a:spLocks noGrp="1"/>
+          </p:cNvSpPr>
+          <p:nvPr>
+            <p:ph type="subTitle" idx="1"/>
+          </p:nvPr>
+        </p:nvSpPr>
+        <p:spPr/>
+        <p:txBody>
+          <a:bodyPr/>
+          <a:lstStyle/>
+          <a:p/>
+        </p:txBody>
+      </p:sp>
+    </p:spTree>
+  </p:cSld>
+  <p:clrMapOvr>
+    <a:masterClrMapping/>
+  </p:clrMapOvr>
+</p:sld>
+</file>
+
+<file path=ppt/slides/slide32.xml><?xml version="1.0" encoding="utf-8"?>
+<p:sld xmlns:a="http://schemas.openxmlformats.org/drawingml/2006/main" xmlns:p="http://schemas.openxmlformats.org/presentationml/2006/main" xmlns:r="http://schemas.openxmlformats.org/officeDocument/2006/relationships">
+  <p:cSld>
+    <p:spTree>
+      <p:nvGrpSpPr>
+        <p:cNvPr id="1" name=""/>
+        <p:cNvGrpSpPr/>
+        <p:nvPr/>
+      </p:nvGrpSpPr>
+      <p:grpSpPr/>
+      <p:sp>
+        <p:nvSpPr>
+          <p:cNvPr id="2" name="Title 1"/>
+          <p:cNvSpPr>
+            <a:spLocks noGrp="1"/>
+          </p:cNvSpPr>
+          <p:nvPr>
+            <p:ph type="ctrTitle"/>
+          </p:nvPr>
+        </p:nvSpPr>
+        <p:spPr/>
+        <p:txBody>
+          <a:bodyPr/>
+          <a:lstStyle/>
+          <a:p>
+            <a:pPr>
+              <a:defRPr sz="3000">
+                <a:latin typeface="함초름돋음"/>
+              </a:defRPr>
+            </a:pPr>
+            <a:r>
+              <a:t>나도 아플 땐 아프다고 슬플땐 슬프다고</a:t>
+            </a:r>
+            <a:br/>
+            <a:r>
+              <a:t>얼어 붙은 심장이 자꾸만 내게로 고자질해</a:t>
+            </a:r>
+            <a:r>
+              <a:t/>
+            </a:r>
+          </a:p>
+        </p:txBody>
+      </p:sp>
+      <p:sp>
+        <p:nvSpPr>
+          <p:cNvPr id="3" name="Subtitle 2"/>
+          <p:cNvSpPr>
+            <a:spLocks noGrp="1"/>
+          </p:cNvSpPr>
+          <p:nvPr>
+            <p:ph type="subTitle" idx="1"/>
+          </p:nvPr>
+        </p:nvSpPr>
+        <p:spPr/>
+        <p:txBody>
+          <a:bodyPr/>
+          <a:lstStyle/>
+          <a:p/>
+        </p:txBody>
+      </p:sp>
+    </p:spTree>
+  </p:cSld>
+  <p:clrMapOvr>
+    <a:masterClrMapping/>
+  </p:clrMapOvr>
+</p:sld>
+</file>
+
+<file path=ppt/slides/slide33.xml><?xml version="1.0" encoding="utf-8"?>
+<p:sld xmlns:a="http://schemas.openxmlformats.org/drawingml/2006/main" xmlns:p="http://schemas.openxmlformats.org/presentationml/2006/main" xmlns:r="http://schemas.openxmlformats.org/officeDocument/2006/relationships">
+  <p:cSld>
+    <p:spTree>
+      <p:nvGrpSpPr>
+        <p:cNvPr id="1" name=""/>
+        <p:cNvGrpSpPr/>
+        <p:nvPr/>
+      </p:nvGrpSpPr>
+      <p:grpSpPr/>
+      <p:sp>
+        <p:nvSpPr>
+          <p:cNvPr id="2" name="Title 1"/>
+          <p:cNvSpPr>
+            <a:spLocks noGrp="1"/>
+          </p:cNvSpPr>
+          <p:nvPr>
+            <p:ph type="ctrTitle"/>
+          </p:nvPr>
+        </p:nvSpPr>
+        <p:spPr/>
+        <p:txBody>
+          <a:bodyPr/>
+          <a:lstStyle/>
+          <a:p>
+            <a:pPr>
+              <a:defRPr sz="3000">
+                <a:latin typeface="함초름돋음"/>
+              </a:defRPr>
+            </a:pPr>
+            <a:r>
+              <a:t>정말로 끝이라고 정말로 괜찮다고</a:t>
+            </a:r>
+            <a:br/>
+            <a:r>
+              <a:t>꾹 참고 참았던 눈물이 자꾸만 내게로 쏟아지네</a:t>
+            </a:r>
+            <a:r>
+              <a:t/>
+            </a:r>
+          </a:p>
+        </p:txBody>
+      </p:sp>
+      <p:sp>
+        <p:nvSpPr>
+          <p:cNvPr id="3" name="Subtitle 2"/>
+          <p:cNvSpPr>
+            <a:spLocks noGrp="1"/>
+          </p:cNvSpPr>
+          <p:nvPr>
+            <p:ph type="subTitle" idx="1"/>
+          </p:nvPr>
+        </p:nvSpPr>
+        <p:spPr/>
+        <p:txBody>
+          <a:bodyPr/>
+          <a:lstStyle/>
+          <a:p/>
+        </p:txBody>
+      </p:sp>
+    </p:spTree>
+  </p:cSld>
+  <p:clrMapOvr>
+    <a:masterClrMapping/>
+  </p:clrMapOvr>
+</p:sld>
+</file>
+
+<file path=ppt/slides/slide34.xml><?xml version="1.0" encoding="utf-8"?>
+<p:sld xmlns:a="http://schemas.openxmlformats.org/drawingml/2006/main" xmlns:p="http://schemas.openxmlformats.org/presentationml/2006/main" xmlns:r="http://schemas.openxmlformats.org/officeDocument/2006/relationships">
+  <p:cSld>
+    <p:spTree>
+      <p:nvGrpSpPr>
+        <p:cNvPr id="1" name=""/>
+        <p:cNvGrpSpPr/>
+        <p:nvPr/>
+      </p:nvGrpSpPr>
+      <p:grpSpPr/>
+      <p:sp>
+        <p:nvSpPr>
+          <p:cNvPr id="2" name="Title 1"/>
+          <p:cNvSpPr>
+            <a:spLocks noGrp="1"/>
+          </p:cNvSpPr>
+          <p:nvPr>
+            <p:ph type="ctrTitle"/>
+          </p:nvPr>
+        </p:nvSpPr>
+        <p:spPr/>
+        <p:txBody>
+          <a:bodyPr/>
+          <a:lstStyle/>
+          <a:p>
+            <a:br/>
+            <a:br/>
+            <a:pPr>
+              <a:defRPr sz="3000">
+                <a:latin typeface="함초름돋음"/>
+              </a:defRPr>
+            </a:pPr>
+            <a:r>
+              <a:t/>
+            </a:r>
+          </a:p>
+        </p:txBody>
+      </p:sp>
+      <p:sp>
+        <p:nvSpPr>
+          <p:cNvPr id="3" name="Subtitle 2"/>
+          <p:cNvSpPr>
+            <a:spLocks noGrp="1"/>
+          </p:cNvSpPr>
+          <p:nvPr>
+            <p:ph type="subTitle" idx="1"/>
+          </p:nvPr>
+        </p:nvSpPr>
+        <p:spPr/>
+        <p:txBody>
+          <a:bodyPr/>
+          <a:lstStyle/>
+          <a:p/>
+        </p:txBody>
+      </p:sp>
+    </p:spTree>
+  </p:cSld>
+  <p:clrMapOvr>
+    <a:masterClrMapping/>
+  </p:clrMapOvr>
+</p:sld>
+</file>
+
+<file path=ppt/slides/slide35.xml><?xml version="1.0" encoding="utf-8"?>
+<p:sld xmlns:a="http://schemas.openxmlformats.org/drawingml/2006/main" xmlns:p="http://schemas.openxmlformats.org/presentationml/2006/main" xmlns:r="http://schemas.openxmlformats.org/officeDocument/2006/relationships">
+  <p:cSld>
+    <p:spTree>
+      <p:nvGrpSpPr>
+        <p:cNvPr id="1" name=""/>
+        <p:cNvGrpSpPr/>
+        <p:nvPr/>
+      </p:nvGrpSpPr>
+      <p:grpSpPr/>
+      <p:sp>
+        <p:nvSpPr>
+          <p:cNvPr id="2" name="Title 1"/>
+          <p:cNvSpPr>
+            <a:spLocks noGrp="1"/>
+          </p:cNvSpPr>
+          <p:nvPr>
+            <p:ph type="ctrTitle"/>
+          </p:nvPr>
+        </p:nvSpPr>
+        <p:spPr/>
+        <p:txBody>
+          <a:bodyPr/>
+          <a:lstStyle/>
+          <a:p>
+            <a:pPr>
+              <a:defRPr sz="3000">
+                <a:latin typeface="함초름돋음"/>
+              </a:defRPr>
+            </a:pPr>
+            <a:r>
+              <a:t>상처를 치료해줄 사람 어디 없나</a:t>
+            </a:r>
+            <a:br/>
+            <a:r>
+              <a:t>가만히 놔두다간 끊임없이 덧나</a:t>
+            </a:r>
+            <a:r>
+              <a:t/>
+            </a:r>
+          </a:p>
+        </p:txBody>
+      </p:sp>
+      <p:sp>
+        <p:nvSpPr>
+          <p:cNvPr id="3" name="Subtitle 2"/>
+          <p:cNvSpPr>
+            <a:spLocks noGrp="1"/>
+          </p:cNvSpPr>
+          <p:nvPr>
+            <p:ph type="subTitle" idx="1"/>
+          </p:nvPr>
+        </p:nvSpPr>
+        <p:spPr/>
+        <p:txBody>
+          <a:bodyPr/>
+          <a:lstStyle/>
+          <a:p/>
+        </p:txBody>
+      </p:sp>
+    </p:spTree>
+  </p:cSld>
+  <p:clrMapOvr>
+    <a:masterClrMapping/>
+  </p:clrMapOvr>
+</p:sld>
+</file>
+
+<file path=ppt/slides/slide36.xml><?xml version="1.0" encoding="utf-8"?>
+<p:sld xmlns:a="http://schemas.openxmlformats.org/drawingml/2006/main" xmlns:p="http://schemas.openxmlformats.org/presentationml/2006/main" xmlns:r="http://schemas.openxmlformats.org/officeDocument/2006/relationships">
+  <p:cSld>
+    <p:spTree>
+      <p:nvGrpSpPr>
+        <p:cNvPr id="1" name=""/>
+        <p:cNvGrpSpPr/>
+        <p:nvPr/>
+      </p:nvGrpSpPr>
+      <p:grpSpPr/>
+      <p:sp>
+        <p:nvSpPr>
+          <p:cNvPr id="2" name="Title 1"/>
+          <p:cNvSpPr>
+            <a:spLocks noGrp="1"/>
+          </p:cNvSpPr>
+          <p:nvPr>
+            <p:ph type="ctrTitle"/>
+          </p:nvPr>
+        </p:nvSpPr>
+        <p:spPr/>
+        <p:txBody>
+          <a:bodyPr/>
+          <a:lstStyle/>
+          <a:p>
+            <a:pPr>
+              <a:defRPr sz="3000">
+                <a:latin typeface="함초름돋음"/>
+              </a:defRPr>
+            </a:pPr>
+            <a:r>
+              <a:t>사랑도 사람도 너무나도 겁나</a:t>
+            </a:r>
+            <a:br/>
+            <a:r>
+              <a:t>혼자인게 무서워 난 잊혀질까 두려워</a:t>
+            </a:r>
+            <a:r>
+              <a:t/>
+            </a:r>
+          </a:p>
+        </p:txBody>
+      </p:sp>
+      <p:sp>
+        <p:nvSpPr>
+          <p:cNvPr id="3" name="Subtitle 2"/>
+          <p:cNvSpPr>
+            <a:spLocks noGrp="1"/>
+          </p:cNvSpPr>
+          <p:nvPr>
+            <p:ph type="subTitle" idx="1"/>
+          </p:nvPr>
+        </p:nvSpPr>
+        <p:spPr/>
+        <p:txBody>
+          <a:bodyPr/>
+          <a:lstStyle/>
+          <a:p/>
+        </p:txBody>
+      </p:sp>
+    </p:spTree>
+  </p:cSld>
+  <p:clrMapOvr>
+    <a:masterClrMapping/>
+  </p:clrMapOvr>
+</p:sld>
+</file>
+
+<file path=ppt/slides/slide37.xml><?xml version="1.0" encoding="utf-8"?>
+<p:sld xmlns:a="http://schemas.openxmlformats.org/drawingml/2006/main" xmlns:p="http://schemas.openxmlformats.org/presentationml/2006/main" xmlns:r="http://schemas.openxmlformats.org/officeDocument/2006/relationships">
+  <p:cSld>
+    <p:spTree>
+      <p:nvGrpSpPr>
+        <p:cNvPr id="1" name=""/>
+        <p:cNvGrpSpPr/>
+        <p:nvPr/>
+      </p:nvGrpSpPr>
+      <p:grpSpPr/>
+      <p:sp>
+        <p:nvSpPr>
+          <p:cNvPr id="2" name="Title 1"/>
+          <p:cNvSpPr>
+            <a:spLocks noGrp="1"/>
+          </p:cNvSpPr>
+          <p:nvPr>
+            <p:ph type="ctrTitle"/>
+          </p:nvPr>
+        </p:nvSpPr>
+        <p:spPr/>
+        <p:txBody>
+          <a:bodyPr/>
+          <a:lstStyle/>
+          <a:p>
+            <a:br/>
+            <a:br/>
+            <a:pPr>
+              <a:defRPr sz="3000">
+                <a:latin typeface="함초름돋음"/>
+              </a:defRPr>
+            </a:pPr>
+            <a:r>
+              <a:t/>
+            </a:r>
+          </a:p>
+        </p:txBody>
+      </p:sp>
+      <p:sp>
+        <p:nvSpPr>
+          <p:cNvPr id="3" name="Subtitle 2"/>
+          <p:cNvSpPr>
+            <a:spLocks noGrp="1"/>
+          </p:cNvSpPr>
+          <p:nvPr>
+            <p:ph type="subTitle" idx="1"/>
+          </p:nvPr>
+        </p:nvSpPr>
+        <p:spPr/>
+        <p:txBody>
+          <a:bodyPr/>
+          <a:lstStyle/>
+          <a:p/>
+        </p:txBody>
+      </p:sp>
+    </p:spTree>
+  </p:cSld>
+  <p:clrMapOvr>
+    <a:masterClrMapping/>
+  </p:clrMapOvr>
+</p:sld>
+</file>
+
+<file path=ppt/slides/slide38.xml><?xml version="1.0" encoding="utf-8"?>
+<p:sld xmlns:a="http://schemas.openxmlformats.org/drawingml/2006/main" xmlns:p="http://schemas.openxmlformats.org/presentationml/2006/main" xmlns:r="http://schemas.openxmlformats.org/officeDocument/2006/relationships">
+  <p:cSld>
+    <p:spTree>
+      <p:nvGrpSpPr>
+        <p:cNvPr id="1" name=""/>
+        <p:cNvGrpSpPr/>
+        <p:nvPr/>
+      </p:nvGrpSpPr>
+      <p:grpSpPr/>
+      <p:sp>
+        <p:nvSpPr>
+          <p:cNvPr id="2" name="Title 1"/>
+          <p:cNvSpPr>
+            <a:spLocks noGrp="1"/>
+          </p:cNvSpPr>
+          <p:nvPr>
+            <p:ph type="ctrTitle"/>
+          </p:nvPr>
+        </p:nvSpPr>
+        <p:spPr/>
+        <p:txBody>
+          <a:bodyPr/>
+          <a:lstStyle/>
+          <a:p>
+            <a:pPr>
+              <a:defRPr sz="3000">
+                <a:latin typeface="함초름돋음"/>
+              </a:defRPr>
+            </a:pPr>
+            <a:r>
+              <a:t>상처를 치료해줄 사람 어디 없나</a:t>
+            </a:r>
+            <a:br/>
+            <a:r>
+              <a:t>가만히 놔두다간 끊임없이 덧나</a:t>
+            </a:r>
+            <a:r>
+              <a:t/>
+            </a:r>
+          </a:p>
+        </p:txBody>
+      </p:sp>
+      <p:sp>
+        <p:nvSpPr>
+          <p:cNvPr id="3" name="Subtitle 2"/>
+          <p:cNvSpPr>
+            <a:spLocks noGrp="1"/>
+          </p:cNvSpPr>
+          <p:nvPr>
+            <p:ph type="subTitle" idx="1"/>
+          </p:nvPr>
+        </p:nvSpPr>
+        <p:spPr/>
+        <p:txBody>
+          <a:bodyPr/>
+          <a:lstStyle/>
+          <a:p/>
+        </p:txBody>
+      </p:sp>
+    </p:spTree>
+  </p:cSld>
+  <p:clrMapOvr>
+    <a:masterClrMapping/>
+  </p:clrMapOvr>
+</p:sld>
+</file>
+
+<file path=ppt/slides/slide39.xml><?xml version="1.0" encoding="utf-8"?>
+<p:sld xmlns:a="http://schemas.openxmlformats.org/drawingml/2006/main" xmlns:p="http://schemas.openxmlformats.org/presentationml/2006/main" xmlns:r="http://schemas.openxmlformats.org/officeDocument/2006/relationships">
+  <p:cSld>
+    <p:spTree>
+      <p:nvGrpSpPr>
+        <p:cNvPr id="1" name=""/>
+        <p:cNvGrpSpPr/>
+        <p:nvPr/>
+      </p:nvGrpSpPr>
+      <p:grpSpPr/>
+      <p:sp>
+        <p:nvSpPr>
+          <p:cNvPr id="2" name="Title 1"/>
+          <p:cNvSpPr>
+            <a:spLocks noGrp="1"/>
+          </p:cNvSpPr>
+          <p:nvPr>
+            <p:ph type="ctrTitle"/>
+          </p:nvPr>
+        </p:nvSpPr>
+        <p:spPr/>
+        <p:txBody>
+          <a:bodyPr/>
+          <a:lstStyle/>
+          <a:p>
+            <a:pPr>
+              <a:defRPr sz="3000">
+                <a:latin typeface="함초름돋음"/>
+              </a:defRPr>
+            </a:pPr>
+            <a:r>
+              <a:t>사랑도 사람도 너무나도 겁나</a:t>
+            </a:r>
+            <a:br/>
+            <a:r>
+              <a:t>혼자인게 무서워 난 잊혀질까 두려워</a:t>
+            </a:r>
+            <a:r>
+              <a:t/>
+            </a:r>
+          </a:p>
+        </p:txBody>
+      </p:sp>
+      <p:sp>
+        <p:nvSpPr>
+          <p:cNvPr id="3" name="Subtitle 2"/>
+          <p:cNvSpPr>
+            <a:spLocks noGrp="1"/>
+          </p:cNvSpPr>
+          <p:nvPr>
+            <p:ph type="subTitle" idx="1"/>
+          </p:nvPr>
+        </p:nvSpPr>
+        <p:spPr/>
+        <p:txBody>
+          <a:bodyPr/>
+          <a:lstStyle/>
+          <a:p/>
+        </p:txBody>
+      </p:sp>
+    </p:spTree>
+  </p:cSld>
+  <p:clrMapOvr>
+    <a:masterClrMapping/>
+  </p:clrMapOvr>
+</p:sld>
+</file>
+
+<file path=ppt/slides/slide4.xml><?xml version="1.0" encoding="utf-8"?>
+<p:sld xmlns:a="http://schemas.openxmlformats.org/drawingml/2006/main" xmlns:p="http://schemas.openxmlformats.org/presentationml/2006/main" xmlns:r="http://schemas.openxmlformats.org/officeDocument/2006/relationships">
+  <p:cSld>
+    <p:spTree>
+      <p:nvGrpSpPr>
+        <p:cNvPr id="1" name=""/>
+        <p:cNvGrpSpPr/>
+        <p:nvPr/>
+      </p:nvGrpSpPr>
+      <p:grpSpPr/>
+      <p:sp>
+        <p:nvSpPr>
+          <p:cNvPr id="2" name="Title 1"/>
+          <p:cNvSpPr>
+            <a:spLocks noGrp="1"/>
+          </p:cNvSpPr>
+          <p:nvPr>
+            <p:ph type="ctrTitle"/>
+          </p:nvPr>
+        </p:nvSpPr>
+        <p:spPr/>
+        <p:txBody>
+          <a:bodyPr/>
+          <a:lstStyle/>
+          <a:p>
+            <a:pPr>
+              <a:defRPr sz="3000">
+                <a:latin typeface="함초름돋음"/>
+              </a:defRPr>
+            </a:pPr>
+            <a:r>
+              <a:t>상처를 치료해줄 사람 어디 없나</a:t>
+            </a:r>
+            <a:br/>
+            <a:r>
+              <a:t>가만히 놔두다간 끊임없이 덧나</a:t>
+            </a:r>
+            <a:r>
+              <a:t/>
+            </a:r>
+          </a:p>
+        </p:txBody>
+      </p:sp>
+      <p:sp>
+        <p:nvSpPr>
+          <p:cNvPr id="3" name="Subtitle 2"/>
+          <p:cNvSpPr>
+            <a:spLocks noGrp="1"/>
+          </p:cNvSpPr>
+          <p:nvPr>
+            <p:ph type="subTitle" idx="1"/>
+          </p:nvPr>
+        </p:nvSpPr>
+        <p:spPr/>
+        <p:txBody>
+          <a:bodyPr/>
+          <a:lstStyle/>
+          <a:p/>
+        </p:txBody>
+      </p:sp>
+    </p:spTree>
+  </p:cSld>
+  <p:clrMapOvr>
+    <a:masterClrMapping/>
+  </p:clrMapOvr>
+</p:sld>
+</file>
+
+<file path=ppt/slides/slide40.xml><?xml version="1.0" encoding="utf-8"?>
+<p:sld xmlns:a="http://schemas.openxmlformats.org/drawingml/2006/main" xmlns:p="http://schemas.openxmlformats.org/presentationml/2006/main" xmlns:r="http://schemas.openxmlformats.org/officeDocument/2006/relationships">
+  <p:cSld>
+    <p:spTree>
+      <p:nvGrpSpPr>
+        <p:cNvPr id="1" name=""/>
+        <p:cNvGrpSpPr/>
+        <p:nvPr/>
+      </p:nvGrpSpPr>
+      <p:grpSpPr/>
+      <p:sp>
+        <p:nvSpPr>
+          <p:cNvPr id="2" name="Title 1"/>
+          <p:cNvSpPr>
+            <a:spLocks noGrp="1"/>
+          </p:cNvSpPr>
+          <p:nvPr>
+            <p:ph type="ctrTitle"/>
+          </p:nvPr>
+        </p:nvSpPr>
+        <p:spPr/>
+        <p:txBody>
+          <a:bodyPr/>
+          <a:lstStyle/>
+          <a:p>
+            <a:br/>
+            <a:br/>
+            <a:pPr>
+              <a:defRPr sz="3000">
+                <a:latin typeface="함초름돋음"/>
+              </a:defRPr>
+            </a:pPr>
+            <a:r>
+              <a:t/>
+            </a:r>
+          </a:p>
+        </p:txBody>
+      </p:sp>
+      <p:sp>
+        <p:nvSpPr>
+          <p:cNvPr id="3" name="Subtitle 2"/>
+          <p:cNvSpPr>
+            <a:spLocks noGrp="1"/>
+          </p:cNvSpPr>
+          <p:nvPr>
+            <p:ph type="subTitle" idx="1"/>
+          </p:nvPr>
+        </p:nvSpPr>
+        <p:spPr/>
+        <p:txBody>
+          <a:bodyPr/>
+          <a:lstStyle/>
+          <a:p/>
+        </p:txBody>
+      </p:sp>
+    </p:spTree>
+  </p:cSld>
+  <p:clrMapOvr>
+    <a:masterClrMapping/>
+  </p:clrMapOvr>
+</p:sld>
+</file>
+
+<file path=ppt/slides/slide41.xml><?xml version="1.0" encoding="utf-8"?>
+<p:sld xmlns:a="http://schemas.openxmlformats.org/drawingml/2006/main" xmlns:p="http://schemas.openxmlformats.org/presentationml/2006/main" xmlns:r="http://schemas.openxmlformats.org/officeDocument/2006/relationships">
+  <p:cSld>
+    <p:spTree>
+      <p:nvGrpSpPr>
+        <p:cNvPr id="1" name=""/>
+        <p:cNvGrpSpPr/>
+        <p:nvPr/>
+      </p:nvGrpSpPr>
+      <p:grpSpPr/>
+      <p:sp>
+        <p:nvSpPr>
+          <p:cNvPr id="2" name="Title 1"/>
+          <p:cNvSpPr>
+            <a:spLocks noGrp="1"/>
+          </p:cNvSpPr>
+          <p:nvPr>
+            <p:ph type="ctrTitle"/>
+          </p:nvPr>
+        </p:nvSpPr>
+        <p:spPr/>
+        <p:txBody>
+          <a:bodyPr/>
+          <a:lstStyle/>
+          <a:p>
+            <a:pPr>
+              <a:defRPr sz="3000">
+                <a:latin typeface="함초름돋음"/>
+              </a:defRPr>
+            </a:pPr>
+            <a:r>
+              <a:t>언제나 외톨이 맘의 문을 닫고</a:t>
+            </a:r>
+            <a:br/>
+            <a:r>
+              <a:t>슬픔을 등에 지고 살아가는 바보</a:t>
+            </a:r>
+            <a:r>
+              <a:t/>
+            </a:r>
+          </a:p>
+        </p:txBody>
+      </p:sp>
+      <p:sp>
+        <p:nvSpPr>
+          <p:cNvPr id="3" name="Subtitle 2"/>
+          <p:cNvSpPr>
+            <a:spLocks noGrp="1"/>
+          </p:cNvSpPr>
+          <p:nvPr>
+            <p:ph type="subTitle" idx="1"/>
+          </p:nvPr>
+        </p:nvSpPr>
+        <p:spPr/>
+        <p:txBody>
+          <a:bodyPr/>
+          <a:lstStyle/>
+          <a:p/>
+        </p:txBody>
+      </p:sp>
+    </p:spTree>
+  </p:cSld>
+  <p:clrMapOvr>
+    <a:masterClrMapping/>
+  </p:clrMapOvr>
+</p:sld>
+</file>
+
+<file path=ppt/slides/slide42.xml><?xml version="1.0" encoding="utf-8"?>
+<p:sld xmlns:a="http://schemas.openxmlformats.org/drawingml/2006/main" xmlns:p="http://schemas.openxmlformats.org/presentationml/2006/main" xmlns:r="http://schemas.openxmlformats.org/officeDocument/2006/relationships">
+  <p:cSld>
+    <p:spTree>
+      <p:nvGrpSpPr>
+        <p:cNvPr id="1" name=""/>
+        <p:cNvGrpSpPr/>
+        <p:nvPr/>
+      </p:nvGrpSpPr>
+      <p:grpSpPr/>
+      <p:sp>
+        <p:nvSpPr>
+          <p:cNvPr id="2" name="Title 1"/>
+          <p:cNvSpPr>
+            <a:spLocks noGrp="1"/>
+          </p:cNvSpPr>
+          <p:nvPr>
+            <p:ph type="ctrTitle"/>
+          </p:nvPr>
+        </p:nvSpPr>
+        <p:spPr/>
+        <p:txBody>
+          <a:bodyPr/>
+          <a:lstStyle/>
+          <a:p>
+            <a:pPr>
+              <a:defRPr sz="3000">
+                <a:latin typeface="함초름돋음"/>
+              </a:defRPr>
+            </a:pPr>
+            <a:r>
+              <a:t>두 눈을 감고 두 귀를 막고</a:t>
+            </a:r>
+            <a:br/>
+            <a:r>
+              <a:t>캄캄한 어둠속에 내 자신을 가둬</a:t>
+            </a:r>
+            <a:r>
+              <a:t/>
+            </a:r>
+          </a:p>
+        </p:txBody>
+      </p:sp>
+      <p:sp>
+        <p:nvSpPr>
+          <p:cNvPr id="3" name="Subtitle 2"/>
+          <p:cNvSpPr>
+            <a:spLocks noGrp="1"/>
+          </p:cNvSpPr>
+          <p:nvPr>
+            <p:ph type="subTitle" idx="1"/>
+          </p:nvPr>
+        </p:nvSpPr>
+        <p:spPr/>
+        <p:txBody>
+          <a:bodyPr/>
+          <a:lstStyle/>
+          <a:p/>
+        </p:txBody>
+      </p:sp>
+    </p:spTree>
+  </p:cSld>
+  <p:clrMapOvr>
+    <a:masterClrMapping/>
+  </p:clrMapOvr>
+</p:sld>
+</file>
+
+<file path=ppt/slides/slide43.xml><?xml version="1.0" encoding="utf-8"?>
+<p:sld xmlns:a="http://schemas.openxmlformats.org/drawingml/2006/main" xmlns:p="http://schemas.openxmlformats.org/presentationml/2006/main" xmlns:r="http://schemas.openxmlformats.org/officeDocument/2006/relationships">
+  <p:cSld>
+    <p:spTree>
+      <p:nvGrpSpPr>
+        <p:cNvPr id="1" name=""/>
+        <p:cNvGrpSpPr/>
+        <p:nvPr/>
+      </p:nvGrpSpPr>
+      <p:grpSpPr/>
+      <p:sp>
+        <p:nvSpPr>
+          <p:cNvPr id="2" name="Title 1"/>
+          <p:cNvSpPr>
+            <a:spLocks noGrp="1"/>
+          </p:cNvSpPr>
+          <p:nvPr>
+            <p:ph type="ctrTitle"/>
+          </p:nvPr>
+        </p:nvSpPr>
+        <p:spPr/>
+        <p:txBody>
+          <a:bodyPr/>
+          <a:lstStyle/>
+          <a:p>
+            <a:br/>
+            <a:br/>
+            <a:pPr>
+              <a:defRPr sz="3000">
+                <a:latin typeface="함초름돋음"/>
+              </a:defRPr>
+            </a:pPr>
+            <a:r>
+              <a:t/>
+            </a:r>
+          </a:p>
+        </p:txBody>
+      </p:sp>
+      <p:sp>
+        <p:nvSpPr>
+          <p:cNvPr id="3" name="Subtitle 2"/>
+          <p:cNvSpPr>
+            <a:spLocks noGrp="1"/>
+          </p:cNvSpPr>
+          <p:nvPr>
+            <p:ph type="subTitle" idx="1"/>
+          </p:nvPr>
+        </p:nvSpPr>
+        <p:spPr/>
+        <p:txBody>
+          <a:bodyPr/>
+          <a:lstStyle/>
+          <a:p/>
+        </p:txBody>
+      </p:sp>
+    </p:spTree>
+  </p:cSld>
+  <p:clrMapOvr>
+    <a:masterClrMapping/>
+  </p:clrMapOvr>
+</p:sld>
+</file>
+
+<file path=ppt/slides/slide44.xml><?xml version="1.0" encoding="utf-8"?>
+<p:sld xmlns:a="http://schemas.openxmlformats.org/drawingml/2006/main" xmlns:p="http://schemas.openxmlformats.org/presentationml/2006/main" xmlns:r="http://schemas.openxmlformats.org/officeDocument/2006/relationships">
+  <p:cSld>
+    <p:spTree>
+      <p:nvGrpSpPr>
+        <p:cNvPr id="1" name=""/>
+        <p:cNvGrpSpPr/>
+        <p:nvPr/>
+      </p:nvGrpSpPr>
+      <p:grpSpPr/>
+      <p:sp>
+        <p:nvSpPr>
+          <p:cNvPr id="2" name="Title 1"/>
+          <p:cNvSpPr>
+            <a:spLocks noGrp="1"/>
+          </p:cNvSpPr>
+          <p:nvPr>
+            <p:ph type="ctrTitle"/>
+          </p:nvPr>
+        </p:nvSpPr>
+        <p:spPr/>
+        <p:txBody>
+          <a:bodyPr/>
+          <a:lstStyle/>
+          <a:p>
+            <a:pPr>
+              <a:defRPr sz="3000">
+                <a:latin typeface="함초름돋음"/>
+              </a:defRPr>
+            </a:pPr>
+            <a:r>
+              <a:t>언제나 외톨이 맘의 문을 닫고</a:t>
+            </a:r>
+            <a:br/>
+            <a:r>
+              <a:t>슬픔을 등에 지고 살아가는 바보</a:t>
+            </a:r>
+            <a:r>
+              <a:t/>
+            </a:r>
+          </a:p>
+        </p:txBody>
+      </p:sp>
+      <p:sp>
+        <p:nvSpPr>
+          <p:cNvPr id="3" name="Subtitle 2"/>
+          <p:cNvSpPr>
+            <a:spLocks noGrp="1"/>
+          </p:cNvSpPr>
+          <p:nvPr>
+            <p:ph type="subTitle" idx="1"/>
+          </p:nvPr>
+        </p:nvSpPr>
+        <p:spPr/>
+        <p:txBody>
+          <a:bodyPr/>
+          <a:lstStyle/>
+          <a:p/>
+        </p:txBody>
+      </p:sp>
+    </p:spTree>
+  </p:cSld>
+  <p:clrMapOvr>
+    <a:masterClrMapping/>
+  </p:clrMapOvr>
+</p:sld>
+</file>
+
+<file path=ppt/slides/slide45.xml><?xml version="1.0" encoding="utf-8"?>
+<p:sld xmlns:a="http://schemas.openxmlformats.org/drawingml/2006/main" xmlns:p="http://schemas.openxmlformats.org/presentationml/2006/main" xmlns:r="http://schemas.openxmlformats.org/officeDocument/2006/relationships">
+  <p:cSld>
+    <p:spTree>
+      <p:nvGrpSpPr>
+        <p:cNvPr id="1" name=""/>
+        <p:cNvGrpSpPr/>
+        <p:nvPr/>
+      </p:nvGrpSpPr>
+      <p:grpSpPr/>
+      <p:sp>
+        <p:nvSpPr>
+          <p:cNvPr id="2" name="Title 1"/>
+          <p:cNvSpPr>
+            <a:spLocks noGrp="1"/>
+          </p:cNvSpPr>
+          <p:nvPr>
+            <p:ph type="ctrTitle"/>
+          </p:nvPr>
+        </p:nvSpPr>
+        <p:spPr/>
+        <p:txBody>
+          <a:bodyPr/>
+          <a:lstStyle/>
+          <a:p>
+            <a:pPr>
+              <a:defRPr sz="3000">
+                <a:latin typeface="함초름돋음"/>
+              </a:defRPr>
+            </a:pPr>
+            <a:r>
+              <a:t>두 눈을 감고 두 귀를 막고</a:t>
+            </a:r>
+            <a:br/>
+            <a:r>
+              <a:t>캄캄한 어둠속에 내 자신을 가둬</a:t>
+            </a:r>
+            <a:r>
+              <a:t/>
+            </a:r>
+          </a:p>
+        </p:txBody>
+      </p:sp>
+      <p:sp>
+        <p:nvSpPr>
+          <p:cNvPr id="3" name="Subtitle 2"/>
+          <p:cNvSpPr>
+            <a:spLocks noGrp="1"/>
+          </p:cNvSpPr>
+          <p:nvPr>
+            <p:ph type="subTitle" idx="1"/>
+          </p:nvPr>
+        </p:nvSpPr>
+        <p:spPr/>
+        <p:txBody>
+          <a:bodyPr/>
+          <a:lstStyle/>
+          <a:p/>
+        </p:txBody>
+      </p:sp>
+    </p:spTree>
+  </p:cSld>
+  <p:clrMapOvr>
+    <a:masterClrMapping/>
+  </p:clrMapOvr>
+</p:sld>
+</file>
+
+<file path=ppt/slides/slide5.xml><?xml version="1.0" encoding="utf-8"?>
+<p:sld xmlns:a="http://schemas.openxmlformats.org/drawingml/2006/main" xmlns:p="http://schemas.openxmlformats.org/presentationml/2006/main" xmlns:r="http://schemas.openxmlformats.org/officeDocument/2006/relationships">
+  <p:cSld>
+    <p:spTree>
+      <p:nvGrpSpPr>
+        <p:cNvPr id="1" name=""/>
+        <p:cNvGrpSpPr/>
+        <p:nvPr/>
+      </p:nvGrpSpPr>
+      <p:grpSpPr/>
+      <p:sp>
+        <p:nvSpPr>
+          <p:cNvPr id="2" name="Title 1"/>
+          <p:cNvSpPr>
+            <a:spLocks noGrp="1"/>
+          </p:cNvSpPr>
+          <p:nvPr>
+            <p:ph type="ctrTitle"/>
+          </p:nvPr>
+        </p:nvSpPr>
+        <p:spPr/>
+        <p:txBody>
+          <a:bodyPr/>
+          <a:lstStyle/>
+          <a:p>
+            <a:pPr>
+              <a:defRPr sz="3000">
+                <a:latin typeface="함초름돋음"/>
+              </a:defRPr>
+            </a:pPr>
+            <a:r>
+              <a:t>사랑도 사람도 너무나도 겁나</a:t>
+            </a:r>
+            <a:br/>
+            <a:r>
+              <a:t>혼자인게 무서워 난 잊혀질까 두려워</a:t>
+            </a:r>
+            <a:r>
+              <a:t/>
+            </a:r>
+          </a:p>
+        </p:txBody>
+      </p:sp>
+      <p:sp>
+        <p:nvSpPr>
+          <p:cNvPr id="3" name="Subtitle 2"/>
+          <p:cNvSpPr>
+            <a:spLocks noGrp="1"/>
+          </p:cNvSpPr>
+          <p:nvPr>
+            <p:ph type="subTitle" idx="1"/>
+          </p:nvPr>
+        </p:nvSpPr>
+        <p:spPr/>
+        <p:txBody>
+          <a:bodyPr/>
+          <a:lstStyle/>
+          <a:p/>
+        </p:txBody>
+      </p:sp>
+    </p:spTree>
+  </p:cSld>
+  <p:clrMapOvr>
+    <a:masterClrMapping/>
+  </p:clrMapOvr>
+</p:sld>
+</file>
+
+<file path=ppt/slides/slide6.xml><?xml version="1.0" encoding="utf-8"?>
+<p:sld xmlns:a="http://schemas.openxmlformats.org/drawingml/2006/main" xmlns:p="http://schemas.openxmlformats.org/presentationml/2006/main" xmlns:r="http://schemas.openxmlformats.org/officeDocument/2006/relationships">
+  <p:cSld>
+    <p:spTree>
+      <p:nvGrpSpPr>
+        <p:cNvPr id="1" name=""/>
+        <p:cNvGrpSpPr/>
+        <p:nvPr/>
+      </p:nvGrpSpPr>
+      <p:grpSpPr/>
+      <p:sp>
+        <p:nvSpPr>
+          <p:cNvPr id="2" name="Title 1"/>
+          <p:cNvSpPr>
+            <a:spLocks noGrp="1"/>
+          </p:cNvSpPr>
+          <p:nvPr>
+            <p:ph type="ctrTitle"/>
+          </p:nvPr>
+        </p:nvSpPr>
+        <p:spPr/>
+        <p:txBody>
+          <a:bodyPr/>
+          <a:lstStyle/>
+          <a:p>
+            <a:br/>
+            <a:br/>
+            <a:pPr>
+              <a:defRPr sz="3000">
+                <a:latin typeface="함초름돋음"/>
+              </a:defRPr>
+            </a:pPr>
+            <a:r>
+              <a:t/>
+            </a:r>
+          </a:p>
+        </p:txBody>
+      </p:sp>
+      <p:sp>
+        <p:nvSpPr>
+          <p:cNvPr id="3" name="Subtitle 2"/>
+          <p:cNvSpPr>
+            <a:spLocks noGrp="1"/>
+          </p:cNvSpPr>
+          <p:nvPr>
+            <p:ph type="subTitle" idx="1"/>
+          </p:nvPr>
+        </p:nvSpPr>
+        <p:spPr/>
+        <p:txBody>
+          <a:bodyPr/>
+          <a:lstStyle/>
+          <a:p/>
+        </p:txBody>
+      </p:sp>
+    </p:spTree>
+  </p:cSld>
+  <p:clrMapOvr>
+    <a:masterClrMapping/>
+  </p:clrMapOvr>
+</p:sld>
+</file>
+
+<file path=ppt/slides/slide7.xml><?xml version="1.0" encoding="utf-8"?>
+<p:sld xmlns:a="http://schemas.openxmlformats.org/drawingml/2006/main" xmlns:p="http://schemas.openxmlformats.org/presentationml/2006/main" xmlns:r="http://schemas.openxmlformats.org/officeDocument/2006/relationships">
+  <p:cSld>
+    <p:spTree>
+      <p:nvGrpSpPr>
+        <p:cNvPr id="1" name=""/>
+        <p:cNvGrpSpPr/>
+        <p:nvPr/>
+      </p:nvGrpSpPr>
+      <p:grpSpPr/>
+      <p:sp>
+        <p:nvSpPr>
+          <p:cNvPr id="2" name="Title 1"/>
+          <p:cNvSpPr>
+            <a:spLocks noGrp="1"/>
+          </p:cNvSpPr>
+          <p:nvPr>
+            <p:ph type="ctrTitle"/>
+          </p:nvPr>
+        </p:nvSpPr>
+        <p:spPr/>
+        <p:txBody>
+          <a:bodyPr/>
+          <a:lstStyle/>
+          <a:p>
+            <a:pPr>
+              <a:defRPr sz="3000">
+                <a:latin typeface="함초름돋음"/>
+              </a:defRPr>
+            </a:pPr>
+            <a:r>
+              <a:t>언제나 외톨이 맘의 문을 닫고</a:t>
+            </a:r>
+            <a:br/>
+            <a:r>
+              <a:t>슬픔을 등에 지고 살아가는 바보</a:t>
+            </a:r>
+            <a:r>
+              <a:t/>
+            </a:r>
+          </a:p>
+        </p:txBody>
+      </p:sp>
+      <p:sp>
+        <p:nvSpPr>
+          <p:cNvPr id="3" name="Subtitle 2"/>
+          <p:cNvSpPr>
+            <a:spLocks noGrp="1"/>
+          </p:cNvSpPr>
+          <p:nvPr>
+            <p:ph type="subTitle" idx="1"/>
+          </p:nvPr>
+        </p:nvSpPr>
+        <p:spPr/>
+        <p:txBody>
+          <a:bodyPr/>
+          <a:lstStyle/>
+          <a:p/>
+        </p:txBody>
+      </p:sp>
+    </p:spTree>
+  </p:cSld>
+  <p:clrMapOvr>
+    <a:masterClrMapping/>
+  </p:clrMapOvr>
+</p:sld>
+</file>
+
+<file path=ppt/slides/slide8.xml><?xml version="1.0" encoding="utf-8"?>
+<p:sld xmlns:a="http://schemas.openxmlformats.org/drawingml/2006/main" xmlns:p="http://schemas.openxmlformats.org/presentationml/2006/main" xmlns:r="http://schemas.openxmlformats.org/officeDocument/2006/relationships">
+  <p:cSld>
+    <p:spTree>
+      <p:nvGrpSpPr>
+        <p:cNvPr id="1" name=""/>
+        <p:cNvGrpSpPr/>
+        <p:nvPr/>
+      </p:nvGrpSpPr>
+      <p:grpSpPr/>
+      <p:sp>
+        <p:nvSpPr>
+          <p:cNvPr id="2" name="Title 1"/>
+          <p:cNvSpPr>
+            <a:spLocks noGrp="1"/>
+          </p:cNvSpPr>
+          <p:nvPr>
+            <p:ph type="ctrTitle"/>
+          </p:nvPr>
+        </p:nvSpPr>
+        <p:spPr/>
+        <p:txBody>
+          <a:bodyPr/>
+          <a:lstStyle/>
+          <a:p>
+            <a:pPr>
+              <a:defRPr sz="3000">
+                <a:latin typeface="함초름돋음"/>
+              </a:defRPr>
+            </a:pPr>
+            <a:r>
+              <a:t>두 눈을 감고 두 귀를 막고</a:t>
+            </a:r>
+            <a:br/>
+            <a:r>
+              <a:t>캄캄한 어둠속에 내 자신을 가둬</a:t>
+            </a:r>
+            <a:r>
+              <a:t/>
+            </a:r>
+          </a:p>
+        </p:txBody>
+      </p:sp>
+      <p:sp>
+        <p:nvSpPr>
+          <p:cNvPr id="3" name="Subtitle 2"/>
+          <p:cNvSpPr>
+            <a:spLocks noGrp="1"/>
+          </p:cNvSpPr>
+          <p:nvPr>
+            <p:ph type="subTitle" idx="1"/>
+          </p:nvPr>
+        </p:nvSpPr>
+        <p:spPr/>
+        <p:txBody>
+          <a:bodyPr/>
+          <a:lstStyle/>
+          <a:p/>
+        </p:txBody>
+      </p:sp>
+    </p:spTree>
+  </p:cSld>
+  <p:clrMapOvr>
+    <a:masterClrMapping/>
+  </p:clrMapOvr>
+</p:sld>
+</file>
+
+<file path=ppt/slides/slide9.xml><?xml version="1.0" encoding="utf-8"?>
+<p:sld xmlns:a="http://schemas.openxmlformats.org/drawingml/2006/main" xmlns:p="http://schemas.openxmlformats.org/presentationml/2006/main" xmlns:r="http://schemas.openxmlformats.org/officeDocument/2006/relationships">
+  <p:cSld>
+    <p:spTree>
+      <p:nvGrpSpPr>
+        <p:cNvPr id="1" name=""/>
+        <p:cNvGrpSpPr/>
+        <p:nvPr/>
+      </p:nvGrpSpPr>
+      <p:grpSpPr/>
+      <p:sp>
+        <p:nvSpPr>
+          <p:cNvPr id="2" name="Title 1"/>
+          <p:cNvSpPr>
+            <a:spLocks noGrp="1"/>
+          </p:cNvSpPr>
+          <p:nvPr>
+            <p:ph type="ctrTitle"/>
+          </p:nvPr>
+        </p:nvSpPr>
+        <p:spPr/>
+        <p:txBody>
+          <a:bodyPr/>
+          <a:lstStyle/>
+          <a:p>
+            <a:br/>
+            <a:br/>
+            <a:pPr>
+              <a:defRPr sz="3000">
+                <a:latin typeface="함초름돋음"/>
+              </a:defRPr>
+            </a:pPr>
             <a:r>
               <a:t/>
             </a:r>

</xml_diff>

<commit_message>
error: global slide num\73,139lines
</commit_message>
<xml_diff>
--- a/UI/add all slides1.pptx
+++ b/UI/add all slides1.pptx
@@ -6,6 +6,7 @@
   </p:sldMasterIdLst>
   <p:sldIdLst>
     <p:sldId id="256" r:id="rId7"/>
+    <p:sldId id="257" r:id="rId8"/>
   </p:sldIdLst>
   <p:sldSz cx="9144000" cy="6858000" type="screen4x3"/>
   <p:notesSz cx="6858000" cy="9144000"/>
@@ -3116,7 +3117,66 @@
               </a:defRPr>
             </a:pPr>
             <a:r>
-              <a:t>csdcvzdv</a:t>
+              <a:t>dwwwwwwwwwww</a:t>
+            </a:r>
+            <a:br/>
+            <a:r>
+              <a:t>gewwwwwwww</a:t>
+            </a:r>
+          </a:p>
+        </p:txBody>
+      </p:sp>
+    </p:spTree>
+  </p:cSld>
+  <p:clrMapOvr>
+    <a:masterClrMapping/>
+  </p:clrMapOvr>
+</p:sld>
+</file>
+
+<file path=ppt/slides/slide2.xml><?xml version="1.0" encoding="utf-8"?>
+<p:sld xmlns:a="http://schemas.openxmlformats.org/drawingml/2006/main" xmlns:p="http://schemas.openxmlformats.org/presentationml/2006/main" xmlns:r="http://schemas.openxmlformats.org/officeDocument/2006/relationships">
+  <p:cSld>
+    <p:spTree>
+      <p:nvGrpSpPr>
+        <p:cNvPr id="1" name=""/>
+        <p:cNvGrpSpPr/>
+        <p:nvPr/>
+      </p:nvGrpSpPr>
+      <p:grpSpPr/>
+      <p:sp>
+        <p:nvSpPr>
+          <p:cNvPr id="2" name="TextBox 1"/>
+          <p:cNvSpPr txBox="1"/>
+          <p:nvPr/>
+        </p:nvSpPr>
+        <p:spPr>
+          <a:xfrm>
+            <a:off x="687600" y="2685600"/>
+            <a:ext cx="1468800" cy="7772400"/>
+          </a:xfrm>
+          <a:prstGeom prst="rect">
+            <a:avLst/>
+          </a:prstGeom>
+          <a:noFill/>
+        </p:spPr>
+        <p:txBody>
+          <a:bodyPr wrap="none">
+            <a:spAutoFit/>
+          </a:bodyPr>
+          <a:lstStyle/>
+          <a:p>
+            <a:pPr>
+              <a:defRPr sz="3000">
+                <a:latin typeface="함초름돋음"/>
+              </a:defRPr>
+            </a:pPr>
+            <a:r>
+              <a:t>aaaaaaaaaaaa</a:t>
+            </a:r>
+            <a:br/>
+            <a:r>
+              <a:t>vzzzzzzzzzzz</a:t>
             </a:r>
           </a:p>
         </p:txBody>

</xml_diff>

<commit_message>
fix global slide_num error &make available Exporting slides in for loop
</commit_message>
<xml_diff>
--- a/UI/add all slides1.pptx
+++ b/UI/add all slides1.pptx
@@ -3117,11 +3117,11 @@
               </a:defRPr>
             </a:pPr>
             <a:r>
-              <a:t>dwwwwwwwwwww</a:t>
+              <a:t>너에게 난</a:t>
             </a:r>
             <a:br/>
             <a:r>
-              <a:t>gewwwwwwww</a:t>
+              <a:t>한여름 노을처럼</a:t>
             </a:r>
           </a:p>
         </p:txBody>
@@ -3172,11 +3172,11 @@
               </a:defRPr>
             </a:pPr>
             <a:r>
-              <a:t>aaaaaaaaaaaa</a:t>
+              <a:t>한편의 아름다운</a:t>
             </a:r>
             <a:br/>
             <a:r>
-              <a:t>vzzzzzzzzzzz</a:t>
+              <a:t>추억이 되고</a:t>
             </a:r>
           </a:p>
         </p:txBody>

</xml_diff>

<commit_message>
create font,size,color combox/make MANY slide imgs.
</commit_message>
<xml_diff>
--- a/UI/add all slides1.pptx
+++ b/UI/add all slides1.pptx
@@ -6,7 +6,6 @@
   </p:sldMasterIdLst>
   <p:sldIdLst>
     <p:sldId id="256" r:id="rId7"/>
-    <p:sldId id="257" r:id="rId8"/>
   </p:sldIdLst>
   <p:sldSz cx="9144000" cy="6858000" type="screen4x3"/>
   <p:notesSz cx="6858000" cy="9144000"/>
@@ -3097,8 +3096,8 @@
         </p:nvSpPr>
         <p:spPr>
           <a:xfrm>
-            <a:off x="687600" y="2685600"/>
-            <a:ext cx="1468800" cy="7772400"/>
+            <a:off x="0" y="0"/>
+            <a:ext cx="9144000" cy="6555600"/>
           </a:xfrm>
           <a:prstGeom prst="rect">
             <a:avLst/>
@@ -3106,78 +3105,18 @@
           <a:noFill/>
         </p:spPr>
         <p:txBody>
-          <a:bodyPr wrap="none">
+          <a:bodyPr wrap="none" anchor="ctr">
             <a:spAutoFit/>
           </a:bodyPr>
           <a:lstStyle/>
           <a:p>
-            <a:pPr>
+            <a:pPr algn="ctr">
               <a:defRPr sz="3000">
                 <a:latin typeface="함초름돋음"/>
               </a:defRPr>
             </a:pPr>
-            <a:r>
-              <a:t>너에게 난</a:t>
-            </a:r>
             <a:br/>
-            <a:r>
-              <a:t>한여름 노을처럼</a:t>
-            </a:r>
-          </a:p>
-        </p:txBody>
-      </p:sp>
-    </p:spTree>
-  </p:cSld>
-  <p:clrMapOvr>
-    <a:masterClrMapping/>
-  </p:clrMapOvr>
-</p:sld>
-</file>
-
-<file path=ppt/slides/slide2.xml><?xml version="1.0" encoding="utf-8"?>
-<p:sld xmlns:a="http://schemas.openxmlformats.org/drawingml/2006/main" xmlns:p="http://schemas.openxmlformats.org/presentationml/2006/main" xmlns:r="http://schemas.openxmlformats.org/officeDocument/2006/relationships">
-  <p:cSld>
-    <p:spTree>
-      <p:nvGrpSpPr>
-        <p:cNvPr id="1" name=""/>
-        <p:cNvGrpSpPr/>
-        <p:nvPr/>
-      </p:nvGrpSpPr>
-      <p:grpSpPr/>
-      <p:sp>
-        <p:nvSpPr>
-          <p:cNvPr id="2" name="TextBox 1"/>
-          <p:cNvSpPr txBox="1"/>
-          <p:nvPr/>
-        </p:nvSpPr>
-        <p:spPr>
-          <a:xfrm>
-            <a:off x="687600" y="2685600"/>
-            <a:ext cx="1468800" cy="7772400"/>
-          </a:xfrm>
-          <a:prstGeom prst="rect">
-            <a:avLst/>
-          </a:prstGeom>
-          <a:noFill/>
-        </p:spPr>
-        <p:txBody>
-          <a:bodyPr wrap="none">
-            <a:spAutoFit/>
-          </a:bodyPr>
-          <a:lstStyle/>
-          <a:p>
-            <a:pPr>
-              <a:defRPr sz="3000">
-                <a:latin typeface="함초름돋음"/>
-              </a:defRPr>
-            </a:pPr>
-            <a:r>
-              <a:t>한편의 아름다운</a:t>
-            </a:r>
             <a:br/>
-            <a:r>
-              <a:t>추억이 되고</a:t>
-            </a:r>
           </a:p>
         </p:txBody>
       </p:sp>

</xml_diff>

<commit_message>
widget size available by setFixedWidth
</commit_message>
<xml_diff>
--- a/UI/add all slides1.pptx
+++ b/UI/add all slides1.pptx
@@ -3090,14 +3090,54 @@
       <p:grpSpPr/>
       <p:sp>
         <p:nvSpPr>
-          <p:cNvPr id="2" name="TextBox 1"/>
+          <p:cNvPr id="2" name="Rectangle 1"/>
+          <p:cNvSpPr/>
+          <p:nvPr/>
+        </p:nvSpPr>
+        <p:spPr>
+          <a:xfrm>
+            <a:off x="914400" y="914400"/>
+            <a:ext cx="7315200" cy="5029200"/>
+          </a:xfrm>
+          <a:prstGeom prst="rect">
+            <a:avLst/>
+          </a:prstGeom>
+          <a:solidFill>
+            <a:srgbClr val="000000"/>
+          </a:solidFill>
+        </p:spPr>
+        <p:style>
+          <a:lnRef idx="1">
+            <a:schemeClr val="accent1"/>
+          </a:lnRef>
+          <a:fillRef idx="3">
+            <a:schemeClr val="accent1"/>
+          </a:fillRef>
+          <a:effectRef idx="2">
+            <a:schemeClr val="accent1"/>
+          </a:effectRef>
+          <a:fontRef idx="minor">
+            <a:schemeClr val="lt1"/>
+          </a:fontRef>
+        </p:style>
+        <p:txBody>
+          <a:bodyPr rtlCol="0" anchor="ctr"/>
+          <a:lstStyle/>
+          <a:p>
+            <a:pPr algn="ctr"/>
+          </a:p>
+        </p:txBody>
+      </p:sp>
+      <p:sp>
+        <p:nvSpPr>
+          <p:cNvPr id="3" name="TextBox 2"/>
           <p:cNvSpPr txBox="1"/>
           <p:nvPr/>
         </p:nvSpPr>
         <p:spPr>
           <a:xfrm>
-            <a:off x="0" y="0"/>
-            <a:ext cx="9144000" cy="6840000"/>
+            <a:off x="914400" y="914400"/>
+            <a:ext cx="7315200" cy="5029200"/>
           </a:xfrm>
           <a:prstGeom prst="rect">
             <a:avLst/>
@@ -3111,13 +3151,15 @@
           <a:lstStyle/>
           <a:p>
             <a:pPr algn="ctr">
-              <a:defRPr sz="3000">
-                <a:latin typeface="함초름돋움"/>
+              <a:defRPr sz="3200">
+                <a:solidFill>
+                  <a:srgbClr val="FFFFFF"/>
+                </a:solidFill>
+                <a:latin typeface="돋음"/>
               </a:defRPr>
             </a:pPr>
-            <a:r>
-              <a:t>wef</a:t>
-            </a:r>
+            <a:br/>
+            <a:br/>
           </a:p>
         </p:txBody>
       </p:sp>

</xml_diff>

<commit_message>
modify imaging timing err
</commit_message>
<xml_diff>
--- a/UI/add all slides1.pptx
+++ b/UI/add all slides1.pptx
@@ -3151,15 +3151,16 @@
           <a:lstStyle/>
           <a:p>
             <a:pPr algn="ctr">
-              <a:defRPr sz="3200">
+              <a:defRPr sz="4800">
                 <a:solidFill>
                   <a:srgbClr val="FFFFFF"/>
                 </a:solidFill>
                 <a:latin typeface="돋음"/>
               </a:defRPr>
             </a:pPr>
-            <a:br/>
-            <a:br/>
+            <a:r>
+              <a:t>zz</a:t>
+            </a:r>
           </a:p>
         </p:txBody>
       </p:sp>

</xml_diff>